<commit_message>
mv classes to testSelf
</commit_message>
<xml_diff>
--- a/cases/goodhostpital2021/对标分析报告.pg.pptx
+++ b/cases/goodhostpital2021/对标分析报告.pg.pptx
@@ -109,13 +109,13 @@
   <p:extLst>
     <p:ext uri="{521415D9-36F7-43E2-AB2F-B90AF26B5E84}">
       <p14:sectionLst xmlns:p14="http://schemas.microsoft.com/office/powerpoint/2010/main">
-        <p14:section name="院内专科BCG散点图" id="{eae45f9e-92c3-30d3-c226-b88e11833f65}">
+        <p14:section name="院内专科BCG散点图" id="{65395a69-a938-1014-68a3-7325f2a96aa5}">
           <p14:sldIdLst>
             <p14:sldId id="257"/>
             <p14:sldId id="258"/>
           </p14:sldIdLst>
         </p14:section>
-        <p14:section name="院内专科梯队表格" id="{572503de-b7f3-1f68-d9e4-9576b26c714a}">
+        <p14:section name="院内专科梯队表格" id="{5cb20cfa-753c-8cb3-f786-04a68b536ff2}">
           <p14:sldIdLst/>
         </p14:section>
       </p14:sectionLst>
@@ -127,7 +127,7 @@
 </p:presentation>
 </file>
 
-<file path=ppt/charts/chart1721.xml><?xml version="1.0" encoding="utf-8"?>
+<file path=ppt/charts/chart245.xml><?xml version="1.0" encoding="utf-8"?>
 <c:chartSpace xmlns:c="http://schemas.openxmlformats.org/drawingml/2006/chart" xmlns:a="http://schemas.openxmlformats.org/drawingml/2006/main" xmlns:r="http://schemas.openxmlformats.org/officeDocument/2006/relationships">
   <c:date1904 val="0"/>
   <c:chart>
@@ -221,7 +221,7 @@
                     </a:pPr>
                     <a:r>
                       <a:rPr lang="en-US" dirty="0"/>
-                      <a:t>关节骨科</a:t>
+                      <a:t>肝病科</a:t>
                     </a:r>
                   </a:p>
                 </c:rich>
@@ -244,7 +244,7 @@
               <c:extLst>
                 <c:ext xmlns:c15="http://schemas.microsoft.com/office/drawing/2012/chart" uri="{CE6537A1-D6FC-4f65-9D91-7224C49458BB}"/>
                 <c:ext xmlns:c16="http://schemas.microsoft.com/office/drawing/2014/chart" uri="{C3380CC4-5D6E-409C-BE32-E72D297353CC}">
-                  <c16:uniqueId val="{00000001-0f98-beb6-d6a9-dd004ba0bad2}"/>
+                  <c16:uniqueId val="{00000001-621c-b36a-0a1c-2e885a9774c0}"/>
                 </c:ext>
               </c:extLst>
             </c:dLbl>
@@ -262,7 +262,7 @@
                     </a:pPr>
                     <a:r>
                       <a:rPr lang="en-US" dirty="0"/>
-                      <a:t>口腔科</a:t>
+                      <a:t>周围血管科</a:t>
                     </a:r>
                   </a:p>
                 </c:rich>
@@ -285,7 +285,7 @@
               <c:extLst>
                 <c:ext xmlns:c15="http://schemas.microsoft.com/office/drawing/2012/chart" uri="{CE6537A1-D6FC-4f65-9D91-7224C49458BB}"/>
                 <c:ext xmlns:c16="http://schemas.microsoft.com/office/drawing/2014/chart" uri="{C3380CC4-5D6E-409C-BE32-E72D297353CC}">
-                  <c16:uniqueId val="{00000002-0f98-beb6-d6a9-dd004ba0bad2}"/>
+                  <c16:uniqueId val="{00000002-621c-b36a-0a1c-2e885a9774c0}"/>
                 </c:ext>
               </c:extLst>
             </c:dLbl>
@@ -303,7 +303,7 @@
                     </a:pPr>
                     <a:r>
                       <a:rPr lang="en-US" dirty="0"/>
-                      <a:t>神经外科</a:t>
+                      <a:t>产科</a:t>
                     </a:r>
                   </a:p>
                 </c:rich>
@@ -326,7 +326,7 @@
               <c:extLst>
                 <c:ext xmlns:c15="http://schemas.microsoft.com/office/drawing/2012/chart" uri="{CE6537A1-D6FC-4f65-9D91-7224C49458BB}"/>
                 <c:ext xmlns:c16="http://schemas.microsoft.com/office/drawing/2014/chart" uri="{C3380CC4-5D6E-409C-BE32-E72D297353CC}">
-                  <c16:uniqueId val="{00000003-0f98-beb6-d6a9-dd004ba0bad2}"/>
+                  <c16:uniqueId val="{00000003-621c-b36a-0a1c-2e885a9774c0}"/>
                 </c:ext>
               </c:extLst>
             </c:dLbl>
@@ -344,7 +344,7 @@
                     </a:pPr>
                     <a:r>
                       <a:rPr lang="en-US" dirty="0"/>
-                      <a:t>妇科妇二科合并</a:t>
+                      <a:t>重症医学科</a:t>
                     </a:r>
                   </a:p>
                 </c:rich>
@@ -367,7 +367,7 @@
               <c:extLst>
                 <c:ext xmlns:c15="http://schemas.microsoft.com/office/drawing/2012/chart" uri="{CE6537A1-D6FC-4f65-9D91-7224C49458BB}"/>
                 <c:ext xmlns:c16="http://schemas.microsoft.com/office/drawing/2014/chart" uri="{C3380CC4-5D6E-409C-BE32-E72D297353CC}">
-                  <c16:uniqueId val="{00000004-0f98-beb6-d6a9-dd004ba0bad2}"/>
+                  <c16:uniqueId val="{00000004-621c-b36a-0a1c-2e885a9774c0}"/>
                 </c:ext>
               </c:extLst>
             </c:dLbl>
@@ -408,7 +408,7 @@
               <c:extLst>
                 <c:ext xmlns:c15="http://schemas.microsoft.com/office/drawing/2012/chart" uri="{CE6537A1-D6FC-4f65-9D91-7224C49458BB}"/>
                 <c:ext xmlns:c16="http://schemas.microsoft.com/office/drawing/2014/chart" uri="{C3380CC4-5D6E-409C-BE32-E72D297353CC}">
-                  <c16:uniqueId val="{00000005-0f98-beb6-d6a9-dd004ba0bad2}"/>
+                  <c16:uniqueId val="{00000005-621c-b36a-0a1c-2e885a9774c0}"/>
                 </c:ext>
               </c:extLst>
             </c:dLbl>
@@ -426,7 +426,7 @@
                     </a:pPr>
                     <a:r>
                       <a:rPr lang="en-US" dirty="0"/>
-                      <a:t>运动损伤骨科</a:t>
+                      <a:t>东区肾病科</a:t>
                     </a:r>
                   </a:p>
                 </c:rich>
@@ -449,12 +449,545 @@
               <c:extLst>
                 <c:ext xmlns:c15="http://schemas.microsoft.com/office/drawing/2012/chart" uri="{CE6537A1-D6FC-4f65-9D91-7224C49458BB}"/>
                 <c:ext xmlns:c16="http://schemas.microsoft.com/office/drawing/2014/chart" uri="{C3380CC4-5D6E-409C-BE32-E72D297353CC}">
-                  <c16:uniqueId val="{00000006-0f98-beb6-d6a9-dd004ba0bad2}"/>
+                  <c16:uniqueId val="{00000006-621c-b36a-0a1c-2e885a9774c0}"/>
                 </c:ext>
               </c:extLst>
             </c:dLbl>
             <c:dLbl>
               <c:idx val="6"/>
+              <c:tx>
+                <c:rich>
+                  <a:bodyPr>
+                    <a:spAutoFit/>
+                  </a:bodyPr>
+                  <a:lstStyle/>
+                  <a:p>
+                    <a:pPr>
+                      <a:defRPr/>
+                    </a:pPr>
+                    <a:r>
+                      <a:rPr lang="en-US" dirty="0"/>
+                      <a:t>肾病科</a:t>
+                    </a:r>
+                  </a:p>
+                </c:rich>
+              </c:tx>
+              <c:spPr>
+                <a:noFill/>
+                <a:ln>
+                  <a:noFill/>
+                </a:ln>
+                <a:effectLst/>
+              </c:spPr>
+              <c:dLblPos val="t"/>
+              <c:showLegendKey val="0"/>
+              <c:showVal val="0"/>
+              <c:showCatName val="0"/>
+              <c:showSerName val="0"/>
+              <c:showPercent val="0"/>
+              <c:showBubbleSize val="0"/>
+              <c:showLeaderLines val="1"/>
+              <c:extLst>
+                <c:ext xmlns:c15="http://schemas.microsoft.com/office/drawing/2012/chart" uri="{CE6537A1-D6FC-4f65-9D91-7224C49458BB}"/>
+                <c:ext xmlns:c16="http://schemas.microsoft.com/office/drawing/2014/chart" uri="{C3380CC4-5D6E-409C-BE32-E72D297353CC}">
+                  <c16:uniqueId val="{00000007-621c-b36a-0a1c-2e885a9774c0}"/>
+                </c:ext>
+              </c:extLst>
+            </c:dLbl>
+            <c:dLbl>
+              <c:idx val="7"/>
+              <c:tx>
+                <c:rich>
+                  <a:bodyPr>
+                    <a:spAutoFit/>
+                  </a:bodyPr>
+                  <a:lstStyle/>
+                  <a:p>
+                    <a:pPr>
+                      <a:defRPr/>
+                    </a:pPr>
+                    <a:r>
+                      <a:rPr lang="en-US" dirty="0"/>
+                      <a:t>微创骨科</a:t>
+                    </a:r>
+                  </a:p>
+                </c:rich>
+              </c:tx>
+              <c:spPr>
+                <a:noFill/>
+                <a:ln>
+                  <a:noFill/>
+                </a:ln>
+                <a:effectLst/>
+              </c:spPr>
+              <c:dLblPos val="t"/>
+              <c:showLegendKey val="0"/>
+              <c:showVal val="0"/>
+              <c:showCatName val="0"/>
+              <c:showSerName val="0"/>
+              <c:showPercent val="0"/>
+              <c:showBubbleSize val="0"/>
+              <c:showLeaderLines val="1"/>
+              <c:extLst>
+                <c:ext xmlns:c15="http://schemas.microsoft.com/office/drawing/2012/chart" uri="{CE6537A1-D6FC-4f65-9D91-7224C49458BB}"/>
+                <c:ext xmlns:c16="http://schemas.microsoft.com/office/drawing/2014/chart" uri="{C3380CC4-5D6E-409C-BE32-E72D297353CC}">
+                  <c16:uniqueId val="{00000008-621c-b36a-0a1c-2e885a9774c0}"/>
+                </c:ext>
+              </c:extLst>
+            </c:dLbl>
+            <c:dLbl>
+              <c:idx val="8"/>
+              <c:tx>
+                <c:rich>
+                  <a:bodyPr>
+                    <a:spAutoFit/>
+                  </a:bodyPr>
+                  <a:lstStyle/>
+                  <a:p>
+                    <a:pPr>
+                      <a:defRPr/>
+                    </a:pPr>
+                    <a:r>
+                      <a:rPr lang="en-US" dirty="0"/>
+                      <a:t>脾胃病科</a:t>
+                    </a:r>
+                  </a:p>
+                </c:rich>
+              </c:tx>
+              <c:spPr>
+                <a:noFill/>
+                <a:ln>
+                  <a:noFill/>
+                </a:ln>
+                <a:effectLst/>
+              </c:spPr>
+              <c:dLblPos val="t"/>
+              <c:showLegendKey val="0"/>
+              <c:showVal val="0"/>
+              <c:showCatName val="0"/>
+              <c:showSerName val="0"/>
+              <c:showPercent val="0"/>
+              <c:showBubbleSize val="0"/>
+              <c:showLeaderLines val="1"/>
+              <c:extLst>
+                <c:ext xmlns:c15="http://schemas.microsoft.com/office/drawing/2012/chart" uri="{CE6537A1-D6FC-4f65-9D91-7224C49458BB}"/>
+                <c:ext xmlns:c16="http://schemas.microsoft.com/office/drawing/2014/chart" uri="{C3380CC4-5D6E-409C-BE32-E72D297353CC}">
+                  <c16:uniqueId val="{00000009-621c-b36a-0a1c-2e885a9774c0}"/>
+                </c:ext>
+              </c:extLst>
+            </c:dLbl>
+            <c:dLbl>
+              <c:idx val="9"/>
+              <c:tx>
+                <c:rich>
+                  <a:bodyPr>
+                    <a:spAutoFit/>
+                  </a:bodyPr>
+                  <a:lstStyle/>
+                  <a:p>
+                    <a:pPr>
+                      <a:defRPr/>
+                    </a:pPr>
+                    <a:r>
+                      <a:rPr lang="en-US" dirty="0"/>
+                      <a:t>小儿骨科</a:t>
+                    </a:r>
+                  </a:p>
+                </c:rich>
+              </c:tx>
+              <c:spPr>
+                <a:noFill/>
+                <a:ln>
+                  <a:noFill/>
+                </a:ln>
+                <a:effectLst/>
+              </c:spPr>
+              <c:dLblPos val="t"/>
+              <c:showLegendKey val="0"/>
+              <c:showVal val="0"/>
+              <c:showCatName val="0"/>
+              <c:showSerName val="0"/>
+              <c:showPercent val="0"/>
+              <c:showBubbleSize val="0"/>
+              <c:showLeaderLines val="1"/>
+              <c:extLst>
+                <c:ext xmlns:c15="http://schemas.microsoft.com/office/drawing/2012/chart" uri="{CE6537A1-D6FC-4f65-9D91-7224C49458BB}"/>
+                <c:ext xmlns:c16="http://schemas.microsoft.com/office/drawing/2014/chart" uri="{C3380CC4-5D6E-409C-BE32-E72D297353CC}">
+                  <c16:uniqueId val="{00000010-621c-b36a-0a1c-2e885a9774c0}"/>
+                </c:ext>
+              </c:extLst>
+            </c:dLbl>
+            <c:dLbl>
+              <c:idx val="10"/>
+              <c:tx>
+                <c:rich>
+                  <a:bodyPr>
+                    <a:spAutoFit/>
+                  </a:bodyPr>
+                  <a:lstStyle/>
+                  <a:p>
+                    <a:pPr>
+                      <a:defRPr/>
+                    </a:pPr>
+                    <a:r>
+                      <a:rPr lang="en-US" dirty="0"/>
+                      <a:t>肿瘤内科</a:t>
+                    </a:r>
+                  </a:p>
+                </c:rich>
+              </c:tx>
+              <c:spPr>
+                <a:noFill/>
+                <a:ln>
+                  <a:noFill/>
+                </a:ln>
+                <a:effectLst/>
+              </c:spPr>
+              <c:dLblPos val="t"/>
+              <c:showLegendKey val="0"/>
+              <c:showVal val="0"/>
+              <c:showCatName val="0"/>
+              <c:showSerName val="0"/>
+              <c:showPercent val="0"/>
+              <c:showBubbleSize val="0"/>
+              <c:showLeaderLines val="1"/>
+              <c:extLst>
+                <c:ext xmlns:c15="http://schemas.microsoft.com/office/drawing/2012/chart" uri="{CE6537A1-D6FC-4f65-9D91-7224C49458BB}"/>
+                <c:ext xmlns:c16="http://schemas.microsoft.com/office/drawing/2014/chart" uri="{C3380CC4-5D6E-409C-BE32-E72D297353CC}">
+                  <c16:uniqueId val="{00000011-621c-b36a-0a1c-2e885a9774c0}"/>
+                </c:ext>
+              </c:extLst>
+            </c:dLbl>
+            <c:dLbl>
+              <c:idx val="11"/>
+              <c:tx>
+                <c:rich>
+                  <a:bodyPr>
+                    <a:spAutoFit/>
+                  </a:bodyPr>
+                  <a:lstStyle/>
+                  <a:p>
+                    <a:pPr>
+                      <a:defRPr/>
+                    </a:pPr>
+                    <a:r>
+                      <a:rPr lang="en-US" dirty="0"/>
+                      <a:t>肛肠科</a:t>
+                    </a:r>
+                  </a:p>
+                </c:rich>
+              </c:tx>
+              <c:spPr>
+                <a:noFill/>
+                <a:ln>
+                  <a:noFill/>
+                </a:ln>
+                <a:effectLst/>
+              </c:spPr>
+              <c:dLblPos val="t"/>
+              <c:showLegendKey val="0"/>
+              <c:showVal val="0"/>
+              <c:showCatName val="0"/>
+              <c:showSerName val="0"/>
+              <c:showPercent val="0"/>
+              <c:showBubbleSize val="0"/>
+              <c:showLeaderLines val="1"/>
+              <c:extLst>
+                <c:ext xmlns:c15="http://schemas.microsoft.com/office/drawing/2012/chart" uri="{CE6537A1-D6FC-4f65-9D91-7224C49458BB}"/>
+                <c:ext xmlns:c16="http://schemas.microsoft.com/office/drawing/2014/chart" uri="{C3380CC4-5D6E-409C-BE32-E72D297353CC}">
+                  <c16:uniqueId val="{00000012-621c-b36a-0a1c-2e885a9774c0}"/>
+                </c:ext>
+              </c:extLst>
+            </c:dLbl>
+            <c:dLbl>
+              <c:idx val="12"/>
+              <c:tx>
+                <c:rich>
+                  <a:bodyPr>
+                    <a:spAutoFit/>
+                  </a:bodyPr>
+                  <a:lstStyle/>
+                  <a:p>
+                    <a:pPr>
+                      <a:defRPr/>
+                    </a:pPr>
+                    <a:r>
+                      <a:rPr lang="en-US" dirty="0"/>
+                      <a:t>脊柱骨科</a:t>
+                    </a:r>
+                  </a:p>
+                </c:rich>
+              </c:tx>
+              <c:spPr>
+                <a:noFill/>
+                <a:ln>
+                  <a:noFill/>
+                </a:ln>
+                <a:effectLst/>
+              </c:spPr>
+              <c:dLblPos val="t"/>
+              <c:showLegendKey val="0"/>
+              <c:showVal val="0"/>
+              <c:showCatName val="0"/>
+              <c:showSerName val="0"/>
+              <c:showPercent val="0"/>
+              <c:showBubbleSize val="0"/>
+              <c:showLeaderLines val="1"/>
+              <c:extLst>
+                <c:ext xmlns:c15="http://schemas.microsoft.com/office/drawing/2012/chart" uri="{CE6537A1-D6FC-4f65-9D91-7224C49458BB}"/>
+                <c:ext xmlns:c16="http://schemas.microsoft.com/office/drawing/2014/chart" uri="{C3380CC4-5D6E-409C-BE32-E72D297353CC}">
+                  <c16:uniqueId val="{00000013-621c-b36a-0a1c-2e885a9774c0}"/>
+                </c:ext>
+              </c:extLst>
+            </c:dLbl>
+            <c:dLbl>
+              <c:idx val="13"/>
+              <c:tx>
+                <c:rich>
+                  <a:bodyPr>
+                    <a:spAutoFit/>
+                  </a:bodyPr>
+                  <a:lstStyle/>
+                  <a:p>
+                    <a:pPr>
+                      <a:defRPr/>
+                    </a:pPr>
+                    <a:r>
+                      <a:rPr lang="en-US" dirty="0"/>
+                      <a:t>脾胃科消化科合并</a:t>
+                    </a:r>
+                  </a:p>
+                </c:rich>
+              </c:tx>
+              <c:spPr>
+                <a:noFill/>
+                <a:ln>
+                  <a:noFill/>
+                </a:ln>
+                <a:effectLst/>
+              </c:spPr>
+              <c:dLblPos val="t"/>
+              <c:showLegendKey val="0"/>
+              <c:showVal val="0"/>
+              <c:showCatName val="0"/>
+              <c:showSerName val="0"/>
+              <c:showPercent val="0"/>
+              <c:showBubbleSize val="0"/>
+              <c:showLeaderLines val="1"/>
+              <c:extLst>
+                <c:ext xmlns:c15="http://schemas.microsoft.com/office/drawing/2012/chart" uri="{CE6537A1-D6FC-4f65-9D91-7224C49458BB}"/>
+                <c:ext xmlns:c16="http://schemas.microsoft.com/office/drawing/2014/chart" uri="{C3380CC4-5D6E-409C-BE32-E72D297353CC}">
+                  <c16:uniqueId val="{00000014-621c-b36a-0a1c-2e885a9774c0}"/>
+                </c:ext>
+              </c:extLst>
+            </c:dLbl>
+            <c:dLbl>
+              <c:idx val="14"/>
+              <c:tx>
+                <c:rich>
+                  <a:bodyPr>
+                    <a:spAutoFit/>
+                  </a:bodyPr>
+                  <a:lstStyle/>
+                  <a:p>
+                    <a:pPr>
+                      <a:defRPr/>
+                    </a:pPr>
+                    <a:r>
+                      <a:rPr lang="en-US" dirty="0"/>
+                      <a:t>心病一科</a:t>
+                    </a:r>
+                  </a:p>
+                </c:rich>
+              </c:tx>
+              <c:spPr>
+                <a:noFill/>
+                <a:ln>
+                  <a:noFill/>
+                </a:ln>
+                <a:effectLst/>
+              </c:spPr>
+              <c:dLblPos val="t"/>
+              <c:showLegendKey val="0"/>
+              <c:showVal val="0"/>
+              <c:showCatName val="0"/>
+              <c:showSerName val="0"/>
+              <c:showPercent val="0"/>
+              <c:showBubbleSize val="0"/>
+              <c:showLeaderLines val="1"/>
+              <c:extLst>
+                <c:ext xmlns:c15="http://schemas.microsoft.com/office/drawing/2012/chart" uri="{CE6537A1-D6FC-4f65-9D91-7224C49458BB}"/>
+                <c:ext xmlns:c16="http://schemas.microsoft.com/office/drawing/2014/chart" uri="{C3380CC4-5D6E-409C-BE32-E72D297353CC}">
+                  <c16:uniqueId val="{00000015-621c-b36a-0a1c-2e885a9774c0}"/>
+                </c:ext>
+              </c:extLst>
+            </c:dLbl>
+            <c:dLbl>
+              <c:idx val="15"/>
+              <c:tx>
+                <c:rich>
+                  <a:bodyPr>
+                    <a:spAutoFit/>
+                  </a:bodyPr>
+                  <a:lstStyle/>
+                  <a:p>
+                    <a:pPr>
+                      <a:defRPr/>
+                    </a:pPr>
+                    <a:r>
+                      <a:rPr lang="en-US" dirty="0"/>
+                      <a:t>心血管内科</a:t>
+                    </a:r>
+                  </a:p>
+                </c:rich>
+              </c:tx>
+              <c:spPr>
+                <a:noFill/>
+                <a:ln>
+                  <a:noFill/>
+                </a:ln>
+                <a:effectLst/>
+              </c:spPr>
+              <c:dLblPos val="t"/>
+              <c:showLegendKey val="0"/>
+              <c:showVal val="0"/>
+              <c:showCatName val="0"/>
+              <c:showSerName val="0"/>
+              <c:showPercent val="0"/>
+              <c:showBubbleSize val="0"/>
+              <c:showLeaderLines val="1"/>
+              <c:extLst>
+                <c:ext xmlns:c15="http://schemas.microsoft.com/office/drawing/2012/chart" uri="{CE6537A1-D6FC-4f65-9D91-7224C49458BB}"/>
+                <c:ext xmlns:c16="http://schemas.microsoft.com/office/drawing/2014/chart" uri="{C3380CC4-5D6E-409C-BE32-E72D297353CC}">
+                  <c16:uniqueId val="{00000016-621c-b36a-0a1c-2e885a9774c0}"/>
+                </c:ext>
+              </c:extLst>
+            </c:dLbl>
+            <c:dLbl>
+              <c:idx val="16"/>
+              <c:tx>
+                <c:rich>
+                  <a:bodyPr>
+                    <a:spAutoFit/>
+                  </a:bodyPr>
+                  <a:lstStyle/>
+                  <a:p>
+                    <a:pPr>
+                      <a:defRPr/>
+                    </a:pPr>
+                    <a:r>
+                      <a:rPr lang="en-US" dirty="0"/>
+                      <a:t>综合内科</a:t>
+                    </a:r>
+                  </a:p>
+                </c:rich>
+              </c:tx>
+              <c:spPr>
+                <a:noFill/>
+                <a:ln>
+                  <a:noFill/>
+                </a:ln>
+                <a:effectLst/>
+              </c:spPr>
+              <c:dLblPos val="t"/>
+              <c:showLegendKey val="0"/>
+              <c:showVal val="0"/>
+              <c:showCatName val="0"/>
+              <c:showSerName val="0"/>
+              <c:showPercent val="0"/>
+              <c:showBubbleSize val="0"/>
+              <c:showLeaderLines val="1"/>
+              <c:extLst>
+                <c:ext xmlns:c15="http://schemas.microsoft.com/office/drawing/2012/chart" uri="{CE6537A1-D6FC-4f65-9D91-7224C49458BB}"/>
+                <c:ext xmlns:c16="http://schemas.microsoft.com/office/drawing/2014/chart" uri="{C3380CC4-5D6E-409C-BE32-E72D297353CC}">
+                  <c16:uniqueId val="{00000017-621c-b36a-0a1c-2e885a9774c0}"/>
+                </c:ext>
+              </c:extLst>
+            </c:dLbl>
+            <c:dLbl>
+              <c:idx val="17"/>
+              <c:tx>
+                <c:rich>
+                  <a:bodyPr>
+                    <a:spAutoFit/>
+                  </a:bodyPr>
+                  <a:lstStyle/>
+                  <a:p>
+                    <a:pPr>
+                      <a:defRPr/>
+                    </a:pPr>
+                    <a:r>
+                      <a:rPr lang="en-US" dirty="0"/>
+                      <a:t>眼科</a:t>
+                    </a:r>
+                  </a:p>
+                </c:rich>
+              </c:tx>
+              <c:spPr>
+                <a:noFill/>
+                <a:ln>
+                  <a:noFill/>
+                </a:ln>
+                <a:effectLst/>
+              </c:spPr>
+              <c:dLblPos val="t"/>
+              <c:showLegendKey val="0"/>
+              <c:showVal val="0"/>
+              <c:showCatName val="0"/>
+              <c:showSerName val="0"/>
+              <c:showPercent val="0"/>
+              <c:showBubbleSize val="0"/>
+              <c:showLeaderLines val="1"/>
+              <c:extLst>
+                <c:ext xmlns:c15="http://schemas.microsoft.com/office/drawing/2012/chart" uri="{CE6537A1-D6FC-4f65-9D91-7224C49458BB}"/>
+                <c:ext xmlns:c16="http://schemas.microsoft.com/office/drawing/2014/chart" uri="{C3380CC4-5D6E-409C-BE32-E72D297353CC}">
+                  <c16:uniqueId val="{00000018-621c-b36a-0a1c-2e885a9774c0}"/>
+                </c:ext>
+              </c:extLst>
+            </c:dLbl>
+            <c:dLbl>
+              <c:idx val="18"/>
+              <c:tx>
+                <c:rich>
+                  <a:bodyPr>
+                    <a:spAutoFit/>
+                  </a:bodyPr>
+                  <a:lstStyle/>
+                  <a:p>
+                    <a:pPr>
+                      <a:defRPr/>
+                    </a:pPr>
+                    <a:r>
+                      <a:rPr lang="en-US" dirty="0"/>
+                      <a:t>脑病三科</a:t>
+                    </a:r>
+                  </a:p>
+                </c:rich>
+              </c:tx>
+              <c:spPr>
+                <a:noFill/>
+                <a:ln>
+                  <a:noFill/>
+                </a:ln>
+                <a:effectLst/>
+              </c:spPr>
+              <c:dLblPos val="t"/>
+              <c:showLegendKey val="0"/>
+              <c:showVal val="0"/>
+              <c:showCatName val="0"/>
+              <c:showSerName val="0"/>
+              <c:showPercent val="0"/>
+              <c:showBubbleSize val="0"/>
+              <c:showLeaderLines val="1"/>
+              <c:extLst>
+                <c:ext xmlns:c15="http://schemas.microsoft.com/office/drawing/2012/chart" uri="{CE6537A1-D6FC-4f65-9D91-7224C49458BB}"/>
+                <c:ext xmlns:c16="http://schemas.microsoft.com/office/drawing/2014/chart" uri="{C3380CC4-5D6E-409C-BE32-E72D297353CC}">
+                  <c16:uniqueId val="{00000019-621c-b36a-0a1c-2e885a9774c0}"/>
+                </c:ext>
+              </c:extLst>
+            </c:dLbl>
+            <c:dLbl>
+              <c:idx val="19"/>
               <c:tx>
                 <c:rich>
                   <a:bodyPr>
@@ -490,540 +1023,7 @@
               <c:extLst>
                 <c:ext xmlns:c15="http://schemas.microsoft.com/office/drawing/2012/chart" uri="{CE6537A1-D6FC-4f65-9D91-7224C49458BB}"/>
                 <c:ext xmlns:c16="http://schemas.microsoft.com/office/drawing/2014/chart" uri="{C3380CC4-5D6E-409C-BE32-E72D297353CC}">
-                  <c16:uniqueId val="{00000007-0f98-beb6-d6a9-dd004ba0bad2}"/>
-                </c:ext>
-              </c:extLst>
-            </c:dLbl>
-            <c:dLbl>
-              <c:idx val="7"/>
-              <c:tx>
-                <c:rich>
-                  <a:bodyPr>
-                    <a:spAutoFit/>
-                  </a:bodyPr>
-                  <a:lstStyle/>
-                  <a:p>
-                    <a:pPr>
-                      <a:defRPr/>
-                    </a:pPr>
-                    <a:r>
-                      <a:rPr lang="en-US" dirty="0"/>
-                      <a:t>脾胃病科</a:t>
-                    </a:r>
-                  </a:p>
-                </c:rich>
-              </c:tx>
-              <c:spPr>
-                <a:noFill/>
-                <a:ln>
-                  <a:noFill/>
-                </a:ln>
-                <a:effectLst/>
-              </c:spPr>
-              <c:dLblPos val="t"/>
-              <c:showLegendKey val="0"/>
-              <c:showVal val="0"/>
-              <c:showCatName val="0"/>
-              <c:showSerName val="0"/>
-              <c:showPercent val="0"/>
-              <c:showBubbleSize val="0"/>
-              <c:showLeaderLines val="1"/>
-              <c:extLst>
-                <c:ext xmlns:c15="http://schemas.microsoft.com/office/drawing/2012/chart" uri="{CE6537A1-D6FC-4f65-9D91-7224C49458BB}"/>
-                <c:ext xmlns:c16="http://schemas.microsoft.com/office/drawing/2014/chart" uri="{C3380CC4-5D6E-409C-BE32-E72D297353CC}">
-                  <c16:uniqueId val="{00000008-0f98-beb6-d6a9-dd004ba0bad2}"/>
-                </c:ext>
-              </c:extLst>
-            </c:dLbl>
-            <c:dLbl>
-              <c:idx val="8"/>
-              <c:tx>
-                <c:rich>
-                  <a:bodyPr>
-                    <a:spAutoFit/>
-                  </a:bodyPr>
-                  <a:lstStyle/>
-                  <a:p>
-                    <a:pPr>
-                      <a:defRPr/>
-                    </a:pPr>
-                    <a:r>
-                      <a:rPr lang="en-US" dirty="0"/>
-                      <a:t>内分泌科</a:t>
-                    </a:r>
-                  </a:p>
-                </c:rich>
-              </c:tx>
-              <c:spPr>
-                <a:noFill/>
-                <a:ln>
-                  <a:noFill/>
-                </a:ln>
-                <a:effectLst/>
-              </c:spPr>
-              <c:dLblPos val="t"/>
-              <c:showLegendKey val="0"/>
-              <c:showVal val="0"/>
-              <c:showCatName val="0"/>
-              <c:showSerName val="0"/>
-              <c:showPercent val="0"/>
-              <c:showBubbleSize val="0"/>
-              <c:showLeaderLines val="1"/>
-              <c:extLst>
-                <c:ext xmlns:c15="http://schemas.microsoft.com/office/drawing/2012/chart" uri="{CE6537A1-D6FC-4f65-9D91-7224C49458BB}"/>
-                <c:ext xmlns:c16="http://schemas.microsoft.com/office/drawing/2014/chart" uri="{C3380CC4-5D6E-409C-BE32-E72D297353CC}">
-                  <c16:uniqueId val="{00000009-0f98-beb6-d6a9-dd004ba0bad2}"/>
-                </c:ext>
-              </c:extLst>
-            </c:dLbl>
-            <c:dLbl>
-              <c:idx val="9"/>
-              <c:tx>
-                <c:rich>
-                  <a:bodyPr>
-                    <a:spAutoFit/>
-                  </a:bodyPr>
-                  <a:lstStyle/>
-                  <a:p>
-                    <a:pPr>
-                      <a:defRPr/>
-                    </a:pPr>
-                    <a:r>
-                      <a:rPr lang="en-US" dirty="0"/>
-                      <a:t>心病四科</a:t>
-                    </a:r>
-                  </a:p>
-                </c:rich>
-              </c:tx>
-              <c:spPr>
-                <a:noFill/>
-                <a:ln>
-                  <a:noFill/>
-                </a:ln>
-                <a:effectLst/>
-              </c:spPr>
-              <c:dLblPos val="t"/>
-              <c:showLegendKey val="0"/>
-              <c:showVal val="0"/>
-              <c:showCatName val="0"/>
-              <c:showSerName val="0"/>
-              <c:showPercent val="0"/>
-              <c:showBubbleSize val="0"/>
-              <c:showLeaderLines val="1"/>
-              <c:extLst>
-                <c:ext xmlns:c15="http://schemas.microsoft.com/office/drawing/2012/chart" uri="{CE6537A1-D6FC-4f65-9D91-7224C49458BB}"/>
-                <c:ext xmlns:c16="http://schemas.microsoft.com/office/drawing/2014/chart" uri="{C3380CC4-5D6E-409C-BE32-E72D297353CC}">
-                  <c16:uniqueId val="{00000010-0f98-beb6-d6a9-dd004ba0bad2}"/>
-                </c:ext>
-              </c:extLst>
-            </c:dLbl>
-            <c:dLbl>
-              <c:idx val="10"/>
-              <c:tx>
-                <c:rich>
-                  <a:bodyPr>
-                    <a:spAutoFit/>
-                  </a:bodyPr>
-                  <a:lstStyle/>
-                  <a:p>
-                    <a:pPr>
-                      <a:defRPr/>
-                    </a:pPr>
-                    <a:r>
-                      <a:rPr lang="en-US" dirty="0"/>
-                      <a:t>中医经典科</a:t>
-                    </a:r>
-                  </a:p>
-                </c:rich>
-              </c:tx>
-              <c:spPr>
-                <a:noFill/>
-                <a:ln>
-                  <a:noFill/>
-                </a:ln>
-                <a:effectLst/>
-              </c:spPr>
-              <c:dLblPos val="t"/>
-              <c:showLegendKey val="0"/>
-              <c:showVal val="0"/>
-              <c:showCatName val="0"/>
-              <c:showSerName val="0"/>
-              <c:showPercent val="0"/>
-              <c:showBubbleSize val="0"/>
-              <c:showLeaderLines val="1"/>
-              <c:extLst>
-                <c:ext xmlns:c15="http://schemas.microsoft.com/office/drawing/2012/chart" uri="{CE6537A1-D6FC-4f65-9D91-7224C49458BB}"/>
-                <c:ext xmlns:c16="http://schemas.microsoft.com/office/drawing/2014/chart" uri="{C3380CC4-5D6E-409C-BE32-E72D297353CC}">
-                  <c16:uniqueId val="{00000011-0f98-beb6-d6a9-dd004ba0bad2}"/>
-                </c:ext>
-              </c:extLst>
-            </c:dLbl>
-            <c:dLbl>
-              <c:idx val="11"/>
-              <c:tx>
-                <c:rich>
-                  <a:bodyPr>
-                    <a:spAutoFit/>
-                  </a:bodyPr>
-                  <a:lstStyle/>
-                  <a:p>
-                    <a:pPr>
-                      <a:defRPr/>
-                    </a:pPr>
-                    <a:r>
-                      <a:rPr lang="en-US" dirty="0"/>
-                      <a:t>耳鼻喉科</a:t>
-                    </a:r>
-                  </a:p>
-                </c:rich>
-              </c:tx>
-              <c:spPr>
-                <a:noFill/>
-                <a:ln>
-                  <a:noFill/>
-                </a:ln>
-                <a:effectLst/>
-              </c:spPr>
-              <c:dLblPos val="t"/>
-              <c:showLegendKey val="0"/>
-              <c:showVal val="0"/>
-              <c:showCatName val="0"/>
-              <c:showSerName val="0"/>
-              <c:showPercent val="0"/>
-              <c:showBubbleSize val="0"/>
-              <c:showLeaderLines val="1"/>
-              <c:extLst>
-                <c:ext xmlns:c15="http://schemas.microsoft.com/office/drawing/2012/chart" uri="{CE6537A1-D6FC-4f65-9D91-7224C49458BB}"/>
-                <c:ext xmlns:c16="http://schemas.microsoft.com/office/drawing/2014/chart" uri="{C3380CC4-5D6E-409C-BE32-E72D297353CC}">
-                  <c16:uniqueId val="{00000012-0f98-beb6-d6a9-dd004ba0bad2}"/>
-                </c:ext>
-              </c:extLst>
-            </c:dLbl>
-            <c:dLbl>
-              <c:idx val="12"/>
-              <c:tx>
-                <c:rich>
-                  <a:bodyPr>
-                    <a:spAutoFit/>
-                  </a:bodyPr>
-                  <a:lstStyle/>
-                  <a:p>
-                    <a:pPr>
-                      <a:defRPr/>
-                    </a:pPr>
-                    <a:r>
-                      <a:rPr lang="en-US" dirty="0"/>
-                      <a:t>泌尿外科</a:t>
-                    </a:r>
-                  </a:p>
-                </c:rich>
-              </c:tx>
-              <c:spPr>
-                <a:noFill/>
-                <a:ln>
-                  <a:noFill/>
-                </a:ln>
-                <a:effectLst/>
-              </c:spPr>
-              <c:dLblPos val="t"/>
-              <c:showLegendKey val="0"/>
-              <c:showVal val="0"/>
-              <c:showCatName val="0"/>
-              <c:showSerName val="0"/>
-              <c:showPercent val="0"/>
-              <c:showBubbleSize val="0"/>
-              <c:showLeaderLines val="1"/>
-              <c:extLst>
-                <c:ext xmlns:c15="http://schemas.microsoft.com/office/drawing/2012/chart" uri="{CE6537A1-D6FC-4f65-9D91-7224C49458BB}"/>
-                <c:ext xmlns:c16="http://schemas.microsoft.com/office/drawing/2014/chart" uri="{C3380CC4-5D6E-409C-BE32-E72D297353CC}">
-                  <c16:uniqueId val="{00000013-0f98-beb6-d6a9-dd004ba0bad2}"/>
-                </c:ext>
-              </c:extLst>
-            </c:dLbl>
-            <c:dLbl>
-              <c:idx val="13"/>
-              <c:tx>
-                <c:rich>
-                  <a:bodyPr>
-                    <a:spAutoFit/>
-                  </a:bodyPr>
-                  <a:lstStyle/>
-                  <a:p>
-                    <a:pPr>
-                      <a:defRPr/>
-                    </a:pPr>
-                    <a:r>
-                      <a:rPr lang="en-US" dirty="0"/>
-                      <a:t>脑病三科</a:t>
-                    </a:r>
-                  </a:p>
-                </c:rich>
-              </c:tx>
-              <c:spPr>
-                <a:noFill/>
-                <a:ln>
-                  <a:noFill/>
-                </a:ln>
-                <a:effectLst/>
-              </c:spPr>
-              <c:dLblPos val="t"/>
-              <c:showLegendKey val="0"/>
-              <c:showVal val="0"/>
-              <c:showCatName val="0"/>
-              <c:showSerName val="0"/>
-              <c:showPercent val="0"/>
-              <c:showBubbleSize val="0"/>
-              <c:showLeaderLines val="1"/>
-              <c:extLst>
-                <c:ext xmlns:c15="http://schemas.microsoft.com/office/drawing/2012/chart" uri="{CE6537A1-D6FC-4f65-9D91-7224C49458BB}"/>
-                <c:ext xmlns:c16="http://schemas.microsoft.com/office/drawing/2014/chart" uri="{C3380CC4-5D6E-409C-BE32-E72D297353CC}">
-                  <c16:uniqueId val="{00000014-0f98-beb6-d6a9-dd004ba0bad2}"/>
-                </c:ext>
-              </c:extLst>
-            </c:dLbl>
-            <c:dLbl>
-              <c:idx val="14"/>
-              <c:tx>
-                <c:rich>
-                  <a:bodyPr>
-                    <a:spAutoFit/>
-                  </a:bodyPr>
-                  <a:lstStyle/>
-                  <a:p>
-                    <a:pPr>
-                      <a:defRPr/>
-                    </a:pPr>
-                    <a:r>
-                      <a:rPr lang="en-US" dirty="0"/>
-                      <a:t>东区肾病科</a:t>
-                    </a:r>
-                  </a:p>
-                </c:rich>
-              </c:tx>
-              <c:spPr>
-                <a:noFill/>
-                <a:ln>
-                  <a:noFill/>
-                </a:ln>
-                <a:effectLst/>
-              </c:spPr>
-              <c:dLblPos val="t"/>
-              <c:showLegendKey val="0"/>
-              <c:showVal val="0"/>
-              <c:showCatName val="0"/>
-              <c:showSerName val="0"/>
-              <c:showPercent val="0"/>
-              <c:showBubbleSize val="0"/>
-              <c:showLeaderLines val="1"/>
-              <c:extLst>
-                <c:ext xmlns:c15="http://schemas.microsoft.com/office/drawing/2012/chart" uri="{CE6537A1-D6FC-4f65-9D91-7224C49458BB}"/>
-                <c:ext xmlns:c16="http://schemas.microsoft.com/office/drawing/2014/chart" uri="{C3380CC4-5D6E-409C-BE32-E72D297353CC}">
-                  <c16:uniqueId val="{00000015-0f98-beb6-d6a9-dd004ba0bad2}"/>
-                </c:ext>
-              </c:extLst>
-            </c:dLbl>
-            <c:dLbl>
-              <c:idx val="15"/>
-              <c:tx>
-                <c:rich>
-                  <a:bodyPr>
-                    <a:spAutoFit/>
-                  </a:bodyPr>
-                  <a:lstStyle/>
-                  <a:p>
-                    <a:pPr>
-                      <a:defRPr/>
-                    </a:pPr>
-                    <a:r>
-                      <a:rPr lang="en-US" dirty="0"/>
-                      <a:t>推拿科</a:t>
-                    </a:r>
-                  </a:p>
-                </c:rich>
-              </c:tx>
-              <c:spPr>
-                <a:noFill/>
-                <a:ln>
-                  <a:noFill/>
-                </a:ln>
-                <a:effectLst/>
-              </c:spPr>
-              <c:dLblPos val="t"/>
-              <c:showLegendKey val="0"/>
-              <c:showVal val="0"/>
-              <c:showCatName val="0"/>
-              <c:showSerName val="0"/>
-              <c:showPercent val="0"/>
-              <c:showBubbleSize val="0"/>
-              <c:showLeaderLines val="1"/>
-              <c:extLst>
-                <c:ext xmlns:c15="http://schemas.microsoft.com/office/drawing/2012/chart" uri="{CE6537A1-D6FC-4f65-9D91-7224C49458BB}"/>
-                <c:ext xmlns:c16="http://schemas.microsoft.com/office/drawing/2014/chart" uri="{C3380CC4-5D6E-409C-BE32-E72D297353CC}">
-                  <c16:uniqueId val="{00000016-0f98-beb6-d6a9-dd004ba0bad2}"/>
-                </c:ext>
-              </c:extLst>
-            </c:dLbl>
-            <c:dLbl>
-              <c:idx val="16"/>
-              <c:tx>
-                <c:rich>
-                  <a:bodyPr>
-                    <a:spAutoFit/>
-                  </a:bodyPr>
-                  <a:lstStyle/>
-                  <a:p>
-                    <a:pPr>
-                      <a:defRPr/>
-                    </a:pPr>
-                    <a:r>
-                      <a:rPr lang="en-US" dirty="0"/>
-                      <a:t>微创骨科</a:t>
-                    </a:r>
-                  </a:p>
-                </c:rich>
-              </c:tx>
-              <c:spPr>
-                <a:noFill/>
-                <a:ln>
-                  <a:noFill/>
-                </a:ln>
-                <a:effectLst/>
-              </c:spPr>
-              <c:dLblPos val="t"/>
-              <c:showLegendKey val="0"/>
-              <c:showVal val="0"/>
-              <c:showCatName val="0"/>
-              <c:showSerName val="0"/>
-              <c:showPercent val="0"/>
-              <c:showBubbleSize val="0"/>
-              <c:showLeaderLines val="1"/>
-              <c:extLst>
-                <c:ext xmlns:c15="http://schemas.microsoft.com/office/drawing/2012/chart" uri="{CE6537A1-D6FC-4f65-9D91-7224C49458BB}"/>
-                <c:ext xmlns:c16="http://schemas.microsoft.com/office/drawing/2014/chart" uri="{C3380CC4-5D6E-409C-BE32-E72D297353CC}">
-                  <c16:uniqueId val="{00000017-0f98-beb6-d6a9-dd004ba0bad2}"/>
-                </c:ext>
-              </c:extLst>
-            </c:dLbl>
-            <c:dLbl>
-              <c:idx val="17"/>
-              <c:tx>
-                <c:rich>
-                  <a:bodyPr>
-                    <a:spAutoFit/>
-                  </a:bodyPr>
-                  <a:lstStyle/>
-                  <a:p>
-                    <a:pPr>
-                      <a:defRPr/>
-                    </a:pPr>
-                    <a:r>
-                      <a:rPr lang="en-US" dirty="0"/>
-                      <a:t>周围血管科</a:t>
-                    </a:r>
-                  </a:p>
-                </c:rich>
-              </c:tx>
-              <c:spPr>
-                <a:noFill/>
-                <a:ln>
-                  <a:noFill/>
-                </a:ln>
-                <a:effectLst/>
-              </c:spPr>
-              <c:dLblPos val="t"/>
-              <c:showLegendKey val="0"/>
-              <c:showVal val="0"/>
-              <c:showCatName val="0"/>
-              <c:showSerName val="0"/>
-              <c:showPercent val="0"/>
-              <c:showBubbleSize val="0"/>
-              <c:showLeaderLines val="1"/>
-              <c:extLst>
-                <c:ext xmlns:c15="http://schemas.microsoft.com/office/drawing/2012/chart" uri="{CE6537A1-D6FC-4f65-9D91-7224C49458BB}"/>
-                <c:ext xmlns:c16="http://schemas.microsoft.com/office/drawing/2014/chart" uri="{C3380CC4-5D6E-409C-BE32-E72D297353CC}">
-                  <c16:uniqueId val="{00000018-0f98-beb6-d6a9-dd004ba0bad2}"/>
-                </c:ext>
-              </c:extLst>
-            </c:dLbl>
-            <c:dLbl>
-              <c:idx val="18"/>
-              <c:tx>
-                <c:rich>
-                  <a:bodyPr>
-                    <a:spAutoFit/>
-                  </a:bodyPr>
-                  <a:lstStyle/>
-                  <a:p>
-                    <a:pPr>
-                      <a:defRPr/>
-                    </a:pPr>
-                    <a:r>
-                      <a:rPr lang="en-US" dirty="0"/>
-                      <a:t>心血管内科</a:t>
-                    </a:r>
-                  </a:p>
-                </c:rich>
-              </c:tx>
-              <c:spPr>
-                <a:noFill/>
-                <a:ln>
-                  <a:noFill/>
-                </a:ln>
-                <a:effectLst/>
-              </c:spPr>
-              <c:dLblPos val="t"/>
-              <c:showLegendKey val="0"/>
-              <c:showVal val="0"/>
-              <c:showCatName val="0"/>
-              <c:showSerName val="0"/>
-              <c:showPercent val="0"/>
-              <c:showBubbleSize val="0"/>
-              <c:showLeaderLines val="1"/>
-              <c:extLst>
-                <c:ext xmlns:c15="http://schemas.microsoft.com/office/drawing/2012/chart" uri="{CE6537A1-D6FC-4f65-9D91-7224C49458BB}"/>
-                <c:ext xmlns:c16="http://schemas.microsoft.com/office/drawing/2014/chart" uri="{C3380CC4-5D6E-409C-BE32-E72D297353CC}">
-                  <c16:uniqueId val="{00000019-0f98-beb6-d6a9-dd004ba0bad2}"/>
-                </c:ext>
-              </c:extLst>
-            </c:dLbl>
-            <c:dLbl>
-              <c:idx val="19"/>
-              <c:tx>
-                <c:rich>
-                  <a:bodyPr>
-                    <a:spAutoFit/>
-                  </a:bodyPr>
-                  <a:lstStyle/>
-                  <a:p>
-                    <a:pPr>
-                      <a:defRPr/>
-                    </a:pPr>
-                    <a:r>
-                      <a:rPr lang="en-US" dirty="0"/>
-                      <a:t>男科</a:t>
-                    </a:r>
-                  </a:p>
-                </c:rich>
-              </c:tx>
-              <c:spPr>
-                <a:noFill/>
-                <a:ln>
-                  <a:noFill/>
-                </a:ln>
-                <a:effectLst/>
-              </c:spPr>
-              <c:dLblPos val="t"/>
-              <c:showLegendKey val="0"/>
-              <c:showVal val="0"/>
-              <c:showCatName val="0"/>
-              <c:showSerName val="0"/>
-              <c:showPercent val="0"/>
-              <c:showBubbleSize val="0"/>
-              <c:showLeaderLines val="1"/>
-              <c:extLst>
-                <c:ext xmlns:c15="http://schemas.microsoft.com/office/drawing/2012/chart" uri="{CE6537A1-D6FC-4f65-9D91-7224C49458BB}"/>
-                <c:ext xmlns:c16="http://schemas.microsoft.com/office/drawing/2014/chart" uri="{C3380CC4-5D6E-409C-BE32-E72D297353CC}">
-                  <c16:uniqueId val="{00000020-0f98-beb6-d6a9-dd004ba0bad2}"/>
+                  <c16:uniqueId val="{00000020-621c-b36a-0a1c-2e885a9774c0}"/>
                 </c:ext>
               </c:extLst>
             </c:dLbl>
@@ -1035,64 +1035,64 @@
                 <c:formatCode>General</c:formatCode>
                 <c:ptCount val="20"/>
                 <c:pt idx="0">
-                  <c:v>0.0022361007128397035</c:v>
+                  <c:v>0.0019570708795094505</c:v>
                 </c:pt>
                 <c:pt idx="1">
-                  <c:v>0.0017299737592286896</c:v>
+                  <c:v>0.0008782268192667935</c:v>
                 </c:pt>
                 <c:pt idx="2">
-                  <c:v>0.00013829387610344288</c:v>
+                  <c:v>0.0003732585750318328</c:v>
                 </c:pt>
                 <c:pt idx="3">
-                  <c:v>0.0017782837199025988</c:v>
+                  <c:v>0.0002499763684729213</c:v>
                 </c:pt>
                 <c:pt idx="4">
-                  <c:v>0.001131526792909811</c:v>
+                  <c:v>0.0007818673371934785</c:v>
                 </c:pt>
                 <c:pt idx="5">
-                  <c:v>0.0002695542419013387</c:v>
+                  <c:v>0.0016893319269836173</c:v>
                 </c:pt>
                 <c:pt idx="6">
-                  <c:v>0.0021294135669049875</c:v>
+                  <c:v>0.0023870969166429573</c:v>
                 </c:pt>
                 <c:pt idx="7">
-                  <c:v>0.00201350585548696</c:v>
+                  <c:v>0.0013727458633846753</c:v>
                 </c:pt>
                 <c:pt idx="8">
-                  <c:v>0.0007343878893685485</c:v>
+                  <c:v>0.000877963985814868</c:v>
                 </c:pt>
                 <c:pt idx="9">
-                  <c:v>0.0020207227506924236</c:v>
+                  <c:v>0.0005502495087947217</c:v>
                 </c:pt>
                 <c:pt idx="10">
-                  <c:v>0.0019399772083270514</c:v>
+                  <c:v>0.0012205119617910143</c:v>
                 </c:pt>
                 <c:pt idx="11">
-                  <c:v>0.00005533565707699024</c:v>
+                  <c:v>0.0011165236258766525</c:v>
                 </c:pt>
                 <c:pt idx="12">
-                  <c:v>0.002087612419226649</c:v>
+                  <c:v>0.0003714017285749419</c:v>
                 </c:pt>
                 <c:pt idx="13">
-                  <c:v>0.0008324178133314873</c:v>
+                  <c:v>0.002354296007145399</c:v>
                 </c:pt>
                 <c:pt idx="14">
-                  <c:v>0.00003020045144187161</c:v>
+                  <c:v>0.0004831777885777541</c:v>
                 </c:pt>
                 <c:pt idx="15">
-                  <c:v>0.0013918235925012568</c:v>
+                  <c:v>0.00039481595252633783</c:v>
                 </c:pt>
                 <c:pt idx="16">
-                  <c:v>0.0020125372859875917</c:v>
+                  <c:v>0.0013418449449780206</c:v>
                 </c:pt>
                 <c:pt idx="17">
-                  <c:v>0.0021201133128033625</c:v>
+                  <c:v>0.0015219072137070645</c:v>
                 </c:pt>
                 <c:pt idx="18">
-                  <c:v>0.001496868092977027</c:v>
+                  <c:v>0.0016804928413720085</c:v>
                 </c:pt>
                 <c:pt idx="19">
-                  <c:v>0.002383219160954926</c:v>
+                  <c:v>0.0012912576966048889</c:v>
                 </c:pt>
               </c:numCache>
             </c:numRef>
@@ -1104,64 +1104,64 @@
                 <c:formatCode>General</c:formatCode>
                 <c:ptCount val="20"/>
                 <c:pt idx="0">
-                  <c:v>100</c:v>
+                  <c:v>99.99999999999999</c:v>
                 </c:pt>
                 <c:pt idx="1">
-                  <c:v>86.28709570038926</c:v>
+                  <c:v>56.48087397747074</c:v>
                 </c:pt>
                 <c:pt idx="2">
-                  <c:v>82.36262037740279</c:v>
+                  <c:v>54.230900655197956</c:v>
                 </c:pt>
                 <c:pt idx="3">
-                  <c:v>53.912037033685785</c:v>
+                  <c:v>40.16448876326349</c:v>
                 </c:pt>
                 <c:pt idx="4">
-                  <c:v>49.11636980167438</c:v>
+                  <c:v>36.26744168663756</c:v>
                 </c:pt>
                 <c:pt idx="5">
-                  <c:v>40.33486573534048</c:v>
+                  <c:v>27.930893486298842</c:v>
                 </c:pt>
                 <c:pt idx="6">
-                  <c:v>35.29791612457484</c:v>
+                  <c:v>27.253497420782384</c:v>
                 </c:pt>
                 <c:pt idx="7">
-                  <c:v>34.218341698323776</c:v>
+                  <c:v>25.756085587890276</c:v>
                 </c:pt>
                 <c:pt idx="8">
-                  <c:v>31.528976386363002</c:v>
+                  <c:v>24.084910610223915</c:v>
                 </c:pt>
                 <c:pt idx="9">
-                  <c:v>30.85539509555974</c:v>
+                  <c:v>20.494688427270177</c:v>
                 </c:pt>
                 <c:pt idx="10">
-                  <c:v>30.04138813605689</c:v>
+                  <c:v>20.028973816606452</c:v>
                 </c:pt>
                 <c:pt idx="11">
-                  <c:v>24.477512816057313</c:v>
+                  <c:v>19.785460667048945</c:v>
                 </c:pt>
                 <c:pt idx="12">
-                  <c:v>23.95121706116508</c:v>
+                  <c:v>19.51455941281204</c:v>
                 </c:pt>
                 <c:pt idx="13">
-                  <c:v>22.36804278233232</c:v>
+                  <c:v>18.893481077690215</c:v>
                 </c:pt>
                 <c:pt idx="14">
-                  <c:v>22.0173445364238</c:v>
+                  <c:v>18.708451685909118</c:v>
                 </c:pt>
                 <c:pt idx="15">
-                  <c:v>20.44233954920479</c:v>
+                  <c:v>18.465615277034978</c:v>
                 </c:pt>
                 <c:pt idx="16">
-                  <c:v>20.066389016362997</c:v>
+                  <c:v>18.312459770306475</c:v>
                 </c:pt>
                 <c:pt idx="17">
-                  <c:v>19.346318025864903</c:v>
+                  <c:v>17.472066794555595</c:v>
                 </c:pt>
                 <c:pt idx="18">
-                  <c:v>19.297220825503214</c:v>
+                  <c:v>17.378351727387134</c:v>
                 </c:pt>
                 <c:pt idx="19">
-                  <c:v>18.736210607864283</c:v>
+                  <c:v>17.185194373541353</c:v>
                 </c:pt>
               </c:numCache>
             </c:numRef>
@@ -1381,7 +1381,7 @@
 </c:chartSpace>
 </file>
 
-<file path=ppt/charts/chart1722.xml><?xml version="1.0" encoding="utf-8"?>
+<file path=ppt/charts/chart246.xml><?xml version="1.0" encoding="utf-8"?>
 <c:chartSpace xmlns:c="http://schemas.openxmlformats.org/drawingml/2006/chart" xmlns:a="http://schemas.openxmlformats.org/drawingml/2006/main" xmlns:r="http://schemas.openxmlformats.org/officeDocument/2006/relationships">
   <c:date1904 val="0"/>
   <c:chart>
@@ -1498,12 +1498,627 @@
               <c:extLst>
                 <c:ext xmlns:c15="http://schemas.microsoft.com/office/drawing/2012/chart" uri="{CE6537A1-D6FC-4f65-9D91-7224C49458BB}"/>
                 <c:ext xmlns:c16="http://schemas.microsoft.com/office/drawing/2014/chart" uri="{C3380CC4-5D6E-409C-BE32-E72D297353CC}">
-                  <c16:uniqueId val="{00000001-9c7c-5234-f38e-4d764bc6aa3c}"/>
+                  <c16:uniqueId val="{00000001-fca5-e63e-25ca-787bae8f6888}"/>
                 </c:ext>
               </c:extLst>
             </c:dLbl>
             <c:dLbl>
               <c:idx val="1"/>
+              <c:tx>
+                <c:rich>
+                  <a:bodyPr>
+                    <a:spAutoFit/>
+                  </a:bodyPr>
+                  <a:lstStyle/>
+                  <a:p>
+                    <a:pPr>
+                      <a:defRPr/>
+                    </a:pPr>
+                    <a:r>
+                      <a:rPr lang="en-US" dirty="0"/>
+                      <a:t>肾病科</a:t>
+                    </a:r>
+                  </a:p>
+                </c:rich>
+              </c:tx>
+              <c:spPr>
+                <a:noFill/>
+                <a:ln>
+                  <a:noFill/>
+                </a:ln>
+                <a:effectLst/>
+              </c:spPr>
+              <c:dLblPos val="t"/>
+              <c:showLegendKey val="0"/>
+              <c:showVal val="0"/>
+              <c:showCatName val="0"/>
+              <c:showSerName val="0"/>
+              <c:showPercent val="0"/>
+              <c:showBubbleSize val="0"/>
+              <c:showLeaderLines val="1"/>
+              <c:extLst>
+                <c:ext xmlns:c15="http://schemas.microsoft.com/office/drawing/2012/chart" uri="{CE6537A1-D6FC-4f65-9D91-7224C49458BB}"/>
+                <c:ext xmlns:c16="http://schemas.microsoft.com/office/drawing/2014/chart" uri="{C3380CC4-5D6E-409C-BE32-E72D297353CC}">
+                  <c16:uniqueId val="{00000002-fca5-e63e-25ca-787bae8f6888}"/>
+                </c:ext>
+              </c:extLst>
+            </c:dLbl>
+            <c:dLbl>
+              <c:idx val="2"/>
+              <c:tx>
+                <c:rich>
+                  <a:bodyPr>
+                    <a:spAutoFit/>
+                  </a:bodyPr>
+                  <a:lstStyle/>
+                  <a:p>
+                    <a:pPr>
+                      <a:defRPr/>
+                    </a:pPr>
+                    <a:r>
+                      <a:rPr lang="en-US" dirty="0"/>
+                      <a:t>脾胃科消化科合并</a:t>
+                    </a:r>
+                  </a:p>
+                </c:rich>
+              </c:tx>
+              <c:spPr>
+                <a:noFill/>
+                <a:ln>
+                  <a:noFill/>
+                </a:ln>
+                <a:effectLst/>
+              </c:spPr>
+              <c:dLblPos val="t"/>
+              <c:showLegendKey val="0"/>
+              <c:showVal val="0"/>
+              <c:showCatName val="0"/>
+              <c:showSerName val="0"/>
+              <c:showPercent val="0"/>
+              <c:showBubbleSize val="0"/>
+              <c:showLeaderLines val="1"/>
+              <c:extLst>
+                <c:ext xmlns:c15="http://schemas.microsoft.com/office/drawing/2012/chart" uri="{CE6537A1-D6FC-4f65-9D91-7224C49458BB}"/>
+                <c:ext xmlns:c16="http://schemas.microsoft.com/office/drawing/2014/chart" uri="{C3380CC4-5D6E-409C-BE32-E72D297353CC}">
+                  <c16:uniqueId val="{00000003-fca5-e63e-25ca-787bae8f6888}"/>
+                </c:ext>
+              </c:extLst>
+            </c:dLbl>
+            <c:dLbl>
+              <c:idx val="3"/>
+              <c:tx>
+                <c:rich>
+                  <a:bodyPr>
+                    <a:spAutoFit/>
+                  </a:bodyPr>
+                  <a:lstStyle/>
+                  <a:p>
+                    <a:pPr>
+                      <a:defRPr/>
+                    </a:pPr>
+                    <a:r>
+                      <a:rPr lang="en-US" dirty="0"/>
+                      <a:t>内分泌科</a:t>
+                    </a:r>
+                  </a:p>
+                </c:rich>
+              </c:tx>
+              <c:spPr>
+                <a:noFill/>
+                <a:ln>
+                  <a:noFill/>
+                </a:ln>
+                <a:effectLst/>
+              </c:spPr>
+              <c:dLblPos val="t"/>
+              <c:showLegendKey val="0"/>
+              <c:showVal val="0"/>
+              <c:showCatName val="0"/>
+              <c:showSerName val="0"/>
+              <c:showPercent val="0"/>
+              <c:showBubbleSize val="0"/>
+              <c:showLeaderLines val="1"/>
+              <c:extLst>
+                <c:ext xmlns:c15="http://schemas.microsoft.com/office/drawing/2012/chart" uri="{CE6537A1-D6FC-4f65-9D91-7224C49458BB}"/>
+                <c:ext xmlns:c16="http://schemas.microsoft.com/office/drawing/2014/chart" uri="{C3380CC4-5D6E-409C-BE32-E72D297353CC}">
+                  <c16:uniqueId val="{00000004-fca5-e63e-25ca-787bae8f6888}"/>
+                </c:ext>
+              </c:extLst>
+            </c:dLbl>
+            <c:dLbl>
+              <c:idx val="4"/>
+              <c:tx>
+                <c:rich>
+                  <a:bodyPr>
+                    <a:spAutoFit/>
+                  </a:bodyPr>
+                  <a:lstStyle/>
+                  <a:p>
+                    <a:pPr>
+                      <a:defRPr/>
+                    </a:pPr>
+                    <a:r>
+                      <a:rPr lang="en-US" dirty="0"/>
+                      <a:t>心病三科</a:t>
+                    </a:r>
+                  </a:p>
+                </c:rich>
+              </c:tx>
+              <c:spPr>
+                <a:noFill/>
+                <a:ln>
+                  <a:noFill/>
+                </a:ln>
+                <a:effectLst/>
+              </c:spPr>
+              <c:dLblPos val="t"/>
+              <c:showLegendKey val="0"/>
+              <c:showVal val="0"/>
+              <c:showCatName val="0"/>
+              <c:showSerName val="0"/>
+              <c:showPercent val="0"/>
+              <c:showBubbleSize val="0"/>
+              <c:showLeaderLines val="1"/>
+              <c:extLst>
+                <c:ext xmlns:c15="http://schemas.microsoft.com/office/drawing/2012/chart" uri="{CE6537A1-D6FC-4f65-9D91-7224C49458BB}"/>
+                <c:ext xmlns:c16="http://schemas.microsoft.com/office/drawing/2014/chart" uri="{C3380CC4-5D6E-409C-BE32-E72D297353CC}">
+                  <c16:uniqueId val="{00000005-fca5-e63e-25ca-787bae8f6888}"/>
+                </c:ext>
+              </c:extLst>
+            </c:dLbl>
+            <c:dLbl>
+              <c:idx val="5"/>
+              <c:tx>
+                <c:rich>
+                  <a:bodyPr>
+                    <a:spAutoFit/>
+                  </a:bodyPr>
+                  <a:lstStyle/>
+                  <a:p>
+                    <a:pPr>
+                      <a:defRPr/>
+                    </a:pPr>
+                    <a:r>
+                      <a:rPr lang="en-US" dirty="0"/>
+                      <a:t>西区重症医学科</a:t>
+                    </a:r>
+                  </a:p>
+                </c:rich>
+              </c:tx>
+              <c:spPr>
+                <a:noFill/>
+                <a:ln>
+                  <a:noFill/>
+                </a:ln>
+                <a:effectLst/>
+              </c:spPr>
+              <c:dLblPos val="t"/>
+              <c:showLegendKey val="0"/>
+              <c:showVal val="0"/>
+              <c:showCatName val="0"/>
+              <c:showSerName val="0"/>
+              <c:showPercent val="0"/>
+              <c:showBubbleSize val="0"/>
+              <c:showLeaderLines val="1"/>
+              <c:extLst>
+                <c:ext xmlns:c15="http://schemas.microsoft.com/office/drawing/2012/chart" uri="{CE6537A1-D6FC-4f65-9D91-7224C49458BB}"/>
+                <c:ext xmlns:c16="http://schemas.microsoft.com/office/drawing/2014/chart" uri="{C3380CC4-5D6E-409C-BE32-E72D297353CC}">
+                  <c16:uniqueId val="{00000006-fca5-e63e-25ca-787bae8f6888}"/>
+                </c:ext>
+              </c:extLst>
+            </c:dLbl>
+            <c:dLbl>
+              <c:idx val="6"/>
+              <c:tx>
+                <c:rich>
+                  <a:bodyPr>
+                    <a:spAutoFit/>
+                  </a:bodyPr>
+                  <a:lstStyle/>
+                  <a:p>
+                    <a:pPr>
+                      <a:defRPr/>
+                    </a:pPr>
+                    <a:r>
+                      <a:rPr lang="en-US" dirty="0"/>
+                      <a:t>神经外科</a:t>
+                    </a:r>
+                  </a:p>
+                </c:rich>
+              </c:tx>
+              <c:spPr>
+                <a:noFill/>
+                <a:ln>
+                  <a:noFill/>
+                </a:ln>
+                <a:effectLst/>
+              </c:spPr>
+              <c:dLblPos val="t"/>
+              <c:showLegendKey val="0"/>
+              <c:showVal val="0"/>
+              <c:showCatName val="0"/>
+              <c:showSerName val="0"/>
+              <c:showPercent val="0"/>
+              <c:showBubbleSize val="0"/>
+              <c:showLeaderLines val="1"/>
+              <c:extLst>
+                <c:ext xmlns:c15="http://schemas.microsoft.com/office/drawing/2012/chart" uri="{CE6537A1-D6FC-4f65-9D91-7224C49458BB}"/>
+                <c:ext xmlns:c16="http://schemas.microsoft.com/office/drawing/2014/chart" uri="{C3380CC4-5D6E-409C-BE32-E72D297353CC}">
+                  <c16:uniqueId val="{00000007-fca5-e63e-25ca-787bae8f6888}"/>
+                </c:ext>
+              </c:extLst>
+            </c:dLbl>
+            <c:dLbl>
+              <c:idx val="7"/>
+              <c:tx>
+                <c:rich>
+                  <a:bodyPr>
+                    <a:spAutoFit/>
+                  </a:bodyPr>
+                  <a:lstStyle/>
+                  <a:p>
+                    <a:pPr>
+                      <a:defRPr/>
+                    </a:pPr>
+                    <a:r>
+                      <a:rPr lang="en-US" dirty="0"/>
+                      <a:t>东区重症医学科</a:t>
+                    </a:r>
+                  </a:p>
+                </c:rich>
+              </c:tx>
+              <c:spPr>
+                <a:noFill/>
+                <a:ln>
+                  <a:noFill/>
+                </a:ln>
+                <a:effectLst/>
+              </c:spPr>
+              <c:dLblPos val="t"/>
+              <c:showLegendKey val="0"/>
+              <c:showVal val="0"/>
+              <c:showCatName val="0"/>
+              <c:showSerName val="0"/>
+              <c:showPercent val="0"/>
+              <c:showBubbleSize val="0"/>
+              <c:showLeaderLines val="1"/>
+              <c:extLst>
+                <c:ext xmlns:c15="http://schemas.microsoft.com/office/drawing/2012/chart" uri="{CE6537A1-D6FC-4f65-9D91-7224C49458BB}"/>
+                <c:ext xmlns:c16="http://schemas.microsoft.com/office/drawing/2014/chart" uri="{C3380CC4-5D6E-409C-BE32-E72D297353CC}">
+                  <c16:uniqueId val="{00000008-fca5-e63e-25ca-787bae8f6888}"/>
+                </c:ext>
+              </c:extLst>
+            </c:dLbl>
+            <c:dLbl>
+              <c:idx val="8"/>
+              <c:tx>
+                <c:rich>
+                  <a:bodyPr>
+                    <a:spAutoFit/>
+                  </a:bodyPr>
+                  <a:lstStyle/>
+                  <a:p>
+                    <a:pPr>
+                      <a:defRPr/>
+                    </a:pPr>
+                    <a:r>
+                      <a:rPr lang="en-US" dirty="0"/>
+                      <a:t>老年医学科</a:t>
+                    </a:r>
+                  </a:p>
+                </c:rich>
+              </c:tx>
+              <c:spPr>
+                <a:noFill/>
+                <a:ln>
+                  <a:noFill/>
+                </a:ln>
+                <a:effectLst/>
+              </c:spPr>
+              <c:dLblPos val="t"/>
+              <c:showLegendKey val="0"/>
+              <c:showVal val="0"/>
+              <c:showCatName val="0"/>
+              <c:showSerName val="0"/>
+              <c:showPercent val="0"/>
+              <c:showBubbleSize val="0"/>
+              <c:showLeaderLines val="1"/>
+              <c:extLst>
+                <c:ext xmlns:c15="http://schemas.microsoft.com/office/drawing/2012/chart" uri="{CE6537A1-D6FC-4f65-9D91-7224C49458BB}"/>
+                <c:ext xmlns:c16="http://schemas.microsoft.com/office/drawing/2014/chart" uri="{C3380CC4-5D6E-409C-BE32-E72D297353CC}">
+                  <c16:uniqueId val="{00000009-fca5-e63e-25ca-787bae8f6888}"/>
+                </c:ext>
+              </c:extLst>
+            </c:dLbl>
+            <c:dLbl>
+              <c:idx val="9"/>
+              <c:tx>
+                <c:rich>
+                  <a:bodyPr>
+                    <a:spAutoFit/>
+                  </a:bodyPr>
+                  <a:lstStyle/>
+                  <a:p>
+                    <a:pPr>
+                      <a:defRPr/>
+                    </a:pPr>
+                    <a:r>
+                      <a:rPr lang="en-US" dirty="0"/>
+                      <a:t>推拿科</a:t>
+                    </a:r>
+                  </a:p>
+                </c:rich>
+              </c:tx>
+              <c:spPr>
+                <a:noFill/>
+                <a:ln>
+                  <a:noFill/>
+                </a:ln>
+                <a:effectLst/>
+              </c:spPr>
+              <c:dLblPos val="t"/>
+              <c:showLegendKey val="0"/>
+              <c:showVal val="0"/>
+              <c:showCatName val="0"/>
+              <c:showSerName val="0"/>
+              <c:showPercent val="0"/>
+              <c:showBubbleSize val="0"/>
+              <c:showLeaderLines val="1"/>
+              <c:extLst>
+                <c:ext xmlns:c15="http://schemas.microsoft.com/office/drawing/2012/chart" uri="{CE6537A1-D6FC-4f65-9D91-7224C49458BB}"/>
+                <c:ext xmlns:c16="http://schemas.microsoft.com/office/drawing/2014/chart" uri="{C3380CC4-5D6E-409C-BE32-E72D297353CC}">
+                  <c16:uniqueId val="{00000010-fca5-e63e-25ca-787bae8f6888}"/>
+                </c:ext>
+              </c:extLst>
+            </c:dLbl>
+            <c:dLbl>
+              <c:idx val="10"/>
+              <c:tx>
+                <c:rich>
+                  <a:bodyPr>
+                    <a:spAutoFit/>
+                  </a:bodyPr>
+                  <a:lstStyle/>
+                  <a:p>
+                    <a:pPr>
+                      <a:defRPr/>
+                    </a:pPr>
+                    <a:r>
+                      <a:rPr lang="en-US" dirty="0"/>
+                      <a:t>神经内科</a:t>
+                    </a:r>
+                  </a:p>
+                </c:rich>
+              </c:tx>
+              <c:spPr>
+                <a:noFill/>
+                <a:ln>
+                  <a:noFill/>
+                </a:ln>
+                <a:effectLst/>
+              </c:spPr>
+              <c:dLblPos val="t"/>
+              <c:showLegendKey val="0"/>
+              <c:showVal val="0"/>
+              <c:showCatName val="0"/>
+              <c:showSerName val="0"/>
+              <c:showPercent val="0"/>
+              <c:showBubbleSize val="0"/>
+              <c:showLeaderLines val="1"/>
+              <c:extLst>
+                <c:ext xmlns:c15="http://schemas.microsoft.com/office/drawing/2012/chart" uri="{CE6537A1-D6FC-4f65-9D91-7224C49458BB}"/>
+                <c:ext xmlns:c16="http://schemas.microsoft.com/office/drawing/2014/chart" uri="{C3380CC4-5D6E-409C-BE32-E72D297353CC}">
+                  <c16:uniqueId val="{00000011-fca5-e63e-25ca-787bae8f6888}"/>
+                </c:ext>
+              </c:extLst>
+            </c:dLbl>
+            <c:dLbl>
+              <c:idx val="11"/>
+              <c:tx>
+                <c:rich>
+                  <a:bodyPr>
+                    <a:spAutoFit/>
+                  </a:bodyPr>
+                  <a:lstStyle/>
+                  <a:p>
+                    <a:pPr>
+                      <a:defRPr/>
+                    </a:pPr>
+                    <a:r>
+                      <a:rPr lang="en-US" dirty="0"/>
+                      <a:t>泌尿外科</a:t>
+                    </a:r>
+                  </a:p>
+                </c:rich>
+              </c:tx>
+              <c:spPr>
+                <a:noFill/>
+                <a:ln>
+                  <a:noFill/>
+                </a:ln>
+                <a:effectLst/>
+              </c:spPr>
+              <c:dLblPos val="t"/>
+              <c:showLegendKey val="0"/>
+              <c:showVal val="0"/>
+              <c:showCatName val="0"/>
+              <c:showSerName val="0"/>
+              <c:showPercent val="0"/>
+              <c:showBubbleSize val="0"/>
+              <c:showLeaderLines val="1"/>
+              <c:extLst>
+                <c:ext xmlns:c15="http://schemas.microsoft.com/office/drawing/2012/chart" uri="{CE6537A1-D6FC-4f65-9D91-7224C49458BB}"/>
+                <c:ext xmlns:c16="http://schemas.microsoft.com/office/drawing/2014/chart" uri="{C3380CC4-5D6E-409C-BE32-E72D297353CC}">
+                  <c16:uniqueId val="{00000012-fca5-e63e-25ca-787bae8f6888}"/>
+                </c:ext>
+              </c:extLst>
+            </c:dLbl>
+            <c:dLbl>
+              <c:idx val="12"/>
+              <c:tx>
+                <c:rich>
+                  <a:bodyPr>
+                    <a:spAutoFit/>
+                  </a:bodyPr>
+                  <a:lstStyle/>
+                  <a:p>
+                    <a:pPr>
+                      <a:defRPr/>
+                    </a:pPr>
+                    <a:r>
+                      <a:rPr lang="en-US" dirty="0"/>
+                      <a:t>小儿推拿科</a:t>
+                    </a:r>
+                  </a:p>
+                </c:rich>
+              </c:tx>
+              <c:spPr>
+                <a:noFill/>
+                <a:ln>
+                  <a:noFill/>
+                </a:ln>
+                <a:effectLst/>
+              </c:spPr>
+              <c:dLblPos val="t"/>
+              <c:showLegendKey val="0"/>
+              <c:showVal val="0"/>
+              <c:showCatName val="0"/>
+              <c:showSerName val="0"/>
+              <c:showPercent val="0"/>
+              <c:showBubbleSize val="0"/>
+              <c:showLeaderLines val="1"/>
+              <c:extLst>
+                <c:ext xmlns:c15="http://schemas.microsoft.com/office/drawing/2012/chart" uri="{CE6537A1-D6FC-4f65-9D91-7224C49458BB}"/>
+                <c:ext xmlns:c16="http://schemas.microsoft.com/office/drawing/2014/chart" uri="{C3380CC4-5D6E-409C-BE32-E72D297353CC}">
+                  <c16:uniqueId val="{00000013-fca5-e63e-25ca-787bae8f6888}"/>
+                </c:ext>
+              </c:extLst>
+            </c:dLbl>
+            <c:dLbl>
+              <c:idx val="13"/>
+              <c:tx>
+                <c:rich>
+                  <a:bodyPr>
+                    <a:spAutoFit/>
+                  </a:bodyPr>
+                  <a:lstStyle/>
+                  <a:p>
+                    <a:pPr>
+                      <a:defRPr/>
+                    </a:pPr>
+                    <a:r>
+                      <a:rPr lang="en-US" dirty="0"/>
+                      <a:t>肝病科</a:t>
+                    </a:r>
+                  </a:p>
+                </c:rich>
+              </c:tx>
+              <c:spPr>
+                <a:noFill/>
+                <a:ln>
+                  <a:noFill/>
+                </a:ln>
+                <a:effectLst/>
+              </c:spPr>
+              <c:dLblPos val="t"/>
+              <c:showLegendKey val="0"/>
+              <c:showVal val="0"/>
+              <c:showCatName val="0"/>
+              <c:showSerName val="0"/>
+              <c:showPercent val="0"/>
+              <c:showBubbleSize val="0"/>
+              <c:showLeaderLines val="1"/>
+              <c:extLst>
+                <c:ext xmlns:c15="http://schemas.microsoft.com/office/drawing/2012/chart" uri="{CE6537A1-D6FC-4f65-9D91-7224C49458BB}"/>
+                <c:ext xmlns:c16="http://schemas.microsoft.com/office/drawing/2014/chart" uri="{C3380CC4-5D6E-409C-BE32-E72D297353CC}">
+                  <c16:uniqueId val="{00000014-fca5-e63e-25ca-787bae8f6888}"/>
+                </c:ext>
+              </c:extLst>
+            </c:dLbl>
+            <c:dLbl>
+              <c:idx val="14"/>
+              <c:tx>
+                <c:rich>
+                  <a:bodyPr>
+                    <a:spAutoFit/>
+                  </a:bodyPr>
+                  <a:lstStyle/>
+                  <a:p>
+                    <a:pPr>
+                      <a:defRPr/>
+                    </a:pPr>
+                    <a:r>
+                      <a:rPr lang="en-US" dirty="0"/>
+                      <a:t>消化内科</a:t>
+                    </a:r>
+                  </a:p>
+                </c:rich>
+              </c:tx>
+              <c:spPr>
+                <a:noFill/>
+                <a:ln>
+                  <a:noFill/>
+                </a:ln>
+                <a:effectLst/>
+              </c:spPr>
+              <c:dLblPos val="t"/>
+              <c:showLegendKey val="0"/>
+              <c:showVal val="0"/>
+              <c:showCatName val="0"/>
+              <c:showSerName val="0"/>
+              <c:showPercent val="0"/>
+              <c:showBubbleSize val="0"/>
+              <c:showLeaderLines val="1"/>
+              <c:extLst>
+                <c:ext xmlns:c15="http://schemas.microsoft.com/office/drawing/2012/chart" uri="{CE6537A1-D6FC-4f65-9D91-7224C49458BB}"/>
+                <c:ext xmlns:c16="http://schemas.microsoft.com/office/drawing/2014/chart" uri="{C3380CC4-5D6E-409C-BE32-E72D297353CC}">
+                  <c16:uniqueId val="{00000015-fca5-e63e-25ca-787bae8f6888}"/>
+                </c:ext>
+              </c:extLst>
+            </c:dLbl>
+            <c:dLbl>
+              <c:idx val="15"/>
+              <c:tx>
+                <c:rich>
+                  <a:bodyPr>
+                    <a:spAutoFit/>
+                  </a:bodyPr>
+                  <a:lstStyle/>
+                  <a:p>
+                    <a:pPr>
+                      <a:defRPr/>
+                    </a:pPr>
+                    <a:r>
+                      <a:rPr lang="en-US" dirty="0"/>
+                      <a:t>针灸科</a:t>
+                    </a:r>
+                  </a:p>
+                </c:rich>
+              </c:tx>
+              <c:spPr>
+                <a:noFill/>
+                <a:ln>
+                  <a:noFill/>
+                </a:ln>
+                <a:effectLst/>
+              </c:spPr>
+              <c:dLblPos val="t"/>
+              <c:showLegendKey val="0"/>
+              <c:showVal val="0"/>
+              <c:showCatName val="0"/>
+              <c:showSerName val="0"/>
+              <c:showPercent val="0"/>
+              <c:showBubbleSize val="0"/>
+              <c:showLeaderLines val="1"/>
+              <c:extLst>
+                <c:ext xmlns:c15="http://schemas.microsoft.com/office/drawing/2012/chart" uri="{CE6537A1-D6FC-4f65-9D91-7224C49458BB}"/>
+                <c:ext xmlns:c16="http://schemas.microsoft.com/office/drawing/2014/chart" uri="{C3380CC4-5D6E-409C-BE32-E72D297353CC}">
+                  <c16:uniqueId val="{00000016-fca5-e63e-25ca-787bae8f6888}"/>
+                </c:ext>
+              </c:extLst>
+            </c:dLbl>
+            <c:dLbl>
+              <c:idx val="16"/>
               <c:tx>
                 <c:rich>
                   <a:bodyPr>
@@ -1539,12 +2154,12 @@
               <c:extLst>
                 <c:ext xmlns:c15="http://schemas.microsoft.com/office/drawing/2012/chart" uri="{CE6537A1-D6FC-4f65-9D91-7224C49458BB}"/>
                 <c:ext xmlns:c16="http://schemas.microsoft.com/office/drawing/2014/chart" uri="{C3380CC4-5D6E-409C-BE32-E72D297353CC}">
-                  <c16:uniqueId val="{00000002-9c7c-5234-f38e-4d764bc6aa3c}"/>
+                  <c16:uniqueId val="{00000017-fca5-e63e-25ca-787bae8f6888}"/>
                 </c:ext>
               </c:extLst>
             </c:dLbl>
             <c:dLbl>
-              <c:idx val="2"/>
+              <c:idx val="17"/>
               <c:tx>
                 <c:rich>
                   <a:bodyPr>
@@ -1557,7 +2172,7 @@
                     </a:pPr>
                     <a:r>
                       <a:rPr lang="en-US" dirty="0"/>
-                      <a:t>心病二科</a:t>
+                      <a:t>显微骨科</a:t>
                     </a:r>
                   </a:p>
                 </c:rich>
@@ -1580,12 +2195,12 @@
               <c:extLst>
                 <c:ext xmlns:c15="http://schemas.microsoft.com/office/drawing/2012/chart" uri="{CE6537A1-D6FC-4f65-9D91-7224C49458BB}"/>
                 <c:ext xmlns:c16="http://schemas.microsoft.com/office/drawing/2014/chart" uri="{C3380CC4-5D6E-409C-BE32-E72D297353CC}">
-                  <c16:uniqueId val="{00000003-9c7c-5234-f38e-4d764bc6aa3c}"/>
+                  <c16:uniqueId val="{00000018-fca5-e63e-25ca-787bae8f6888}"/>
                 </c:ext>
               </c:extLst>
             </c:dLbl>
             <c:dLbl>
-              <c:idx val="3"/>
+              <c:idx val="18"/>
               <c:tx>
                 <c:rich>
                   <a:bodyPr>
@@ -1598,7 +2213,7 @@
                     </a:pPr>
                     <a:r>
                       <a:rPr lang="en-US" dirty="0"/>
-                      <a:t>肾脏内科</a:t>
+                      <a:t>脑病一科</a:t>
                     </a:r>
                   </a:p>
                 </c:rich>
@@ -1621,622 +2236,7 @@
               <c:extLst>
                 <c:ext xmlns:c15="http://schemas.microsoft.com/office/drawing/2012/chart" uri="{CE6537A1-D6FC-4f65-9D91-7224C49458BB}"/>
                 <c:ext xmlns:c16="http://schemas.microsoft.com/office/drawing/2014/chart" uri="{C3380CC4-5D6E-409C-BE32-E72D297353CC}">
-                  <c16:uniqueId val="{00000004-9c7c-5234-f38e-4d764bc6aa3c}"/>
-                </c:ext>
-              </c:extLst>
-            </c:dLbl>
-            <c:dLbl>
-              <c:idx val="4"/>
-              <c:tx>
-                <c:rich>
-                  <a:bodyPr>
-                    <a:spAutoFit/>
-                  </a:bodyPr>
-                  <a:lstStyle/>
-                  <a:p>
-                    <a:pPr>
-                      <a:defRPr/>
-                    </a:pPr>
-                    <a:r>
-                      <a:rPr lang="en-US" dirty="0"/>
-                      <a:t>关节骨科</a:t>
-                    </a:r>
-                  </a:p>
-                </c:rich>
-              </c:tx>
-              <c:spPr>
-                <a:noFill/>
-                <a:ln>
-                  <a:noFill/>
-                </a:ln>
-                <a:effectLst/>
-              </c:spPr>
-              <c:dLblPos val="t"/>
-              <c:showLegendKey val="0"/>
-              <c:showVal val="0"/>
-              <c:showCatName val="0"/>
-              <c:showSerName val="0"/>
-              <c:showPercent val="0"/>
-              <c:showBubbleSize val="0"/>
-              <c:showLeaderLines val="1"/>
-              <c:extLst>
-                <c:ext xmlns:c15="http://schemas.microsoft.com/office/drawing/2012/chart" uri="{CE6537A1-D6FC-4f65-9D91-7224C49458BB}"/>
-                <c:ext xmlns:c16="http://schemas.microsoft.com/office/drawing/2014/chart" uri="{C3380CC4-5D6E-409C-BE32-E72D297353CC}">
-                  <c16:uniqueId val="{00000005-9c7c-5234-f38e-4d764bc6aa3c}"/>
-                </c:ext>
-              </c:extLst>
-            </c:dLbl>
-            <c:dLbl>
-              <c:idx val="5"/>
-              <c:tx>
-                <c:rich>
-                  <a:bodyPr>
-                    <a:spAutoFit/>
-                  </a:bodyPr>
-                  <a:lstStyle/>
-                  <a:p>
-                    <a:pPr>
-                      <a:defRPr/>
-                    </a:pPr>
-                    <a:r>
-                      <a:rPr lang="en-US" dirty="0"/>
-                      <a:t>妇科</a:t>
-                    </a:r>
-                  </a:p>
-                </c:rich>
-              </c:tx>
-              <c:spPr>
-                <a:noFill/>
-                <a:ln>
-                  <a:noFill/>
-                </a:ln>
-                <a:effectLst/>
-              </c:spPr>
-              <c:dLblPos val="t"/>
-              <c:showLegendKey val="0"/>
-              <c:showVal val="0"/>
-              <c:showCatName val="0"/>
-              <c:showSerName val="0"/>
-              <c:showPercent val="0"/>
-              <c:showBubbleSize val="0"/>
-              <c:showLeaderLines val="1"/>
-              <c:extLst>
-                <c:ext xmlns:c15="http://schemas.microsoft.com/office/drawing/2012/chart" uri="{CE6537A1-D6FC-4f65-9D91-7224C49458BB}"/>
-                <c:ext xmlns:c16="http://schemas.microsoft.com/office/drawing/2014/chart" uri="{C3380CC4-5D6E-409C-BE32-E72D297353CC}">
-                  <c16:uniqueId val="{00000006-9c7c-5234-f38e-4d764bc6aa3c}"/>
-                </c:ext>
-              </c:extLst>
-            </c:dLbl>
-            <c:dLbl>
-              <c:idx val="6"/>
-              <c:tx>
-                <c:rich>
-                  <a:bodyPr>
-                    <a:spAutoFit/>
-                  </a:bodyPr>
-                  <a:lstStyle/>
-                  <a:p>
-                    <a:pPr>
-                      <a:defRPr/>
-                    </a:pPr>
-                    <a:r>
-                      <a:rPr lang="en-US" dirty="0"/>
-                      <a:t>心病一科</a:t>
-                    </a:r>
-                  </a:p>
-                </c:rich>
-              </c:tx>
-              <c:spPr>
-                <a:noFill/>
-                <a:ln>
-                  <a:noFill/>
-                </a:ln>
-                <a:effectLst/>
-              </c:spPr>
-              <c:dLblPos val="t"/>
-              <c:showLegendKey val="0"/>
-              <c:showVal val="0"/>
-              <c:showCatName val="0"/>
-              <c:showSerName val="0"/>
-              <c:showPercent val="0"/>
-              <c:showBubbleSize val="0"/>
-              <c:showLeaderLines val="1"/>
-              <c:extLst>
-                <c:ext xmlns:c15="http://schemas.microsoft.com/office/drawing/2012/chart" uri="{CE6537A1-D6FC-4f65-9D91-7224C49458BB}"/>
-                <c:ext xmlns:c16="http://schemas.microsoft.com/office/drawing/2014/chart" uri="{C3380CC4-5D6E-409C-BE32-E72D297353CC}">
-                  <c16:uniqueId val="{00000007-9c7c-5234-f38e-4d764bc6aa3c}"/>
-                </c:ext>
-              </c:extLst>
-            </c:dLbl>
-            <c:dLbl>
-              <c:idx val="7"/>
-              <c:tx>
-                <c:rich>
-                  <a:bodyPr>
-                    <a:spAutoFit/>
-                  </a:bodyPr>
-                  <a:lstStyle/>
-                  <a:p>
-                    <a:pPr>
-                      <a:defRPr/>
-                    </a:pPr>
-                    <a:r>
-                      <a:rPr lang="en-US" dirty="0"/>
-                      <a:t>中医外治中心</a:t>
-                    </a:r>
-                  </a:p>
-                </c:rich>
-              </c:tx>
-              <c:spPr>
-                <a:noFill/>
-                <a:ln>
-                  <a:noFill/>
-                </a:ln>
-                <a:effectLst/>
-              </c:spPr>
-              <c:dLblPos val="t"/>
-              <c:showLegendKey val="0"/>
-              <c:showVal val="0"/>
-              <c:showCatName val="0"/>
-              <c:showSerName val="0"/>
-              <c:showPercent val="0"/>
-              <c:showBubbleSize val="0"/>
-              <c:showLeaderLines val="1"/>
-              <c:extLst>
-                <c:ext xmlns:c15="http://schemas.microsoft.com/office/drawing/2012/chart" uri="{CE6537A1-D6FC-4f65-9D91-7224C49458BB}"/>
-                <c:ext xmlns:c16="http://schemas.microsoft.com/office/drawing/2014/chart" uri="{C3380CC4-5D6E-409C-BE32-E72D297353CC}">
-                  <c16:uniqueId val="{00000008-9c7c-5234-f38e-4d764bc6aa3c}"/>
-                </c:ext>
-              </c:extLst>
-            </c:dLbl>
-            <c:dLbl>
-              <c:idx val="8"/>
-              <c:tx>
-                <c:rich>
-                  <a:bodyPr>
-                    <a:spAutoFit/>
-                  </a:bodyPr>
-                  <a:lstStyle/>
-                  <a:p>
-                    <a:pPr>
-                      <a:defRPr/>
-                    </a:pPr>
-                    <a:r>
-                      <a:rPr lang="en-US" dirty="0"/>
-                      <a:t>周围血管科</a:t>
-                    </a:r>
-                  </a:p>
-                </c:rich>
-              </c:tx>
-              <c:spPr>
-                <a:noFill/>
-                <a:ln>
-                  <a:noFill/>
-                </a:ln>
-                <a:effectLst/>
-              </c:spPr>
-              <c:dLblPos val="t"/>
-              <c:showLegendKey val="0"/>
-              <c:showVal val="0"/>
-              <c:showCatName val="0"/>
-              <c:showSerName val="0"/>
-              <c:showPercent val="0"/>
-              <c:showBubbleSize val="0"/>
-              <c:showLeaderLines val="1"/>
-              <c:extLst>
-                <c:ext xmlns:c15="http://schemas.microsoft.com/office/drawing/2012/chart" uri="{CE6537A1-D6FC-4f65-9D91-7224C49458BB}"/>
-                <c:ext xmlns:c16="http://schemas.microsoft.com/office/drawing/2014/chart" uri="{C3380CC4-5D6E-409C-BE32-E72D297353CC}">
-                  <c16:uniqueId val="{00000009-9c7c-5234-f38e-4d764bc6aa3c}"/>
-                </c:ext>
-              </c:extLst>
-            </c:dLbl>
-            <c:dLbl>
-              <c:idx val="9"/>
-              <c:tx>
-                <c:rich>
-                  <a:bodyPr>
-                    <a:spAutoFit/>
-                  </a:bodyPr>
-                  <a:lstStyle/>
-                  <a:p>
-                    <a:pPr>
-                      <a:defRPr/>
-                    </a:pPr>
-                    <a:r>
-                      <a:rPr lang="en-US" dirty="0"/>
-                      <a:t>泌尿外科</a:t>
-                    </a:r>
-                  </a:p>
-                </c:rich>
-              </c:tx>
-              <c:spPr>
-                <a:noFill/>
-                <a:ln>
-                  <a:noFill/>
-                </a:ln>
-                <a:effectLst/>
-              </c:spPr>
-              <c:dLblPos val="t"/>
-              <c:showLegendKey val="0"/>
-              <c:showVal val="0"/>
-              <c:showCatName val="0"/>
-              <c:showSerName val="0"/>
-              <c:showPercent val="0"/>
-              <c:showBubbleSize val="0"/>
-              <c:showLeaderLines val="1"/>
-              <c:extLst>
-                <c:ext xmlns:c15="http://schemas.microsoft.com/office/drawing/2012/chart" uri="{CE6537A1-D6FC-4f65-9D91-7224C49458BB}"/>
-                <c:ext xmlns:c16="http://schemas.microsoft.com/office/drawing/2014/chart" uri="{C3380CC4-5D6E-409C-BE32-E72D297353CC}">
-                  <c16:uniqueId val="{00000010-9c7c-5234-f38e-4d764bc6aa3c}"/>
-                </c:ext>
-              </c:extLst>
-            </c:dLbl>
-            <c:dLbl>
-              <c:idx val="10"/>
-              <c:tx>
-                <c:rich>
-                  <a:bodyPr>
-                    <a:spAutoFit/>
-                  </a:bodyPr>
-                  <a:lstStyle/>
-                  <a:p>
-                    <a:pPr>
-                      <a:defRPr/>
-                    </a:pPr>
-                    <a:r>
-                      <a:rPr lang="en-US" dirty="0"/>
-                      <a:t>心病四科</a:t>
-                    </a:r>
-                  </a:p>
-                </c:rich>
-              </c:tx>
-              <c:spPr>
-                <a:noFill/>
-                <a:ln>
-                  <a:noFill/>
-                </a:ln>
-                <a:effectLst/>
-              </c:spPr>
-              <c:dLblPos val="t"/>
-              <c:showLegendKey val="0"/>
-              <c:showVal val="0"/>
-              <c:showCatName val="0"/>
-              <c:showSerName val="0"/>
-              <c:showPercent val="0"/>
-              <c:showBubbleSize val="0"/>
-              <c:showLeaderLines val="1"/>
-              <c:extLst>
-                <c:ext xmlns:c15="http://schemas.microsoft.com/office/drawing/2012/chart" uri="{CE6537A1-D6FC-4f65-9D91-7224C49458BB}"/>
-                <c:ext xmlns:c16="http://schemas.microsoft.com/office/drawing/2014/chart" uri="{C3380CC4-5D6E-409C-BE32-E72D297353CC}">
-                  <c16:uniqueId val="{00000011-9c7c-5234-f38e-4d764bc6aa3c}"/>
-                </c:ext>
-              </c:extLst>
-            </c:dLbl>
-            <c:dLbl>
-              <c:idx val="11"/>
-              <c:tx>
-                <c:rich>
-                  <a:bodyPr>
-                    <a:spAutoFit/>
-                  </a:bodyPr>
-                  <a:lstStyle/>
-                  <a:p>
-                    <a:pPr>
-                      <a:defRPr/>
-                    </a:pPr>
-                    <a:r>
-                      <a:rPr lang="en-US" dirty="0"/>
-                      <a:t>脾胃病科</a:t>
-                    </a:r>
-                  </a:p>
-                </c:rich>
-              </c:tx>
-              <c:spPr>
-                <a:noFill/>
-                <a:ln>
-                  <a:noFill/>
-                </a:ln>
-                <a:effectLst/>
-              </c:spPr>
-              <c:dLblPos val="t"/>
-              <c:showLegendKey val="0"/>
-              <c:showVal val="0"/>
-              <c:showCatName val="0"/>
-              <c:showSerName val="0"/>
-              <c:showPercent val="0"/>
-              <c:showBubbleSize val="0"/>
-              <c:showLeaderLines val="1"/>
-              <c:extLst>
-                <c:ext xmlns:c15="http://schemas.microsoft.com/office/drawing/2012/chart" uri="{CE6537A1-D6FC-4f65-9D91-7224C49458BB}"/>
-                <c:ext xmlns:c16="http://schemas.microsoft.com/office/drawing/2014/chart" uri="{C3380CC4-5D6E-409C-BE32-E72D297353CC}">
-                  <c16:uniqueId val="{00000012-9c7c-5234-f38e-4d764bc6aa3c}"/>
-                </c:ext>
-              </c:extLst>
-            </c:dLbl>
-            <c:dLbl>
-              <c:idx val="12"/>
-              <c:tx>
-                <c:rich>
-                  <a:bodyPr>
-                    <a:spAutoFit/>
-                  </a:bodyPr>
-                  <a:lstStyle/>
-                  <a:p>
-                    <a:pPr>
-                      <a:defRPr/>
-                    </a:pPr>
-                    <a:r>
-                      <a:rPr lang="en-US" dirty="0"/>
-                      <a:t>微创骨科</a:t>
-                    </a:r>
-                  </a:p>
-                </c:rich>
-              </c:tx>
-              <c:spPr>
-                <a:noFill/>
-                <a:ln>
-                  <a:noFill/>
-                </a:ln>
-                <a:effectLst/>
-              </c:spPr>
-              <c:dLblPos val="t"/>
-              <c:showLegendKey val="0"/>
-              <c:showVal val="0"/>
-              <c:showCatName val="0"/>
-              <c:showSerName val="0"/>
-              <c:showPercent val="0"/>
-              <c:showBubbleSize val="0"/>
-              <c:showLeaderLines val="1"/>
-              <c:extLst>
-                <c:ext xmlns:c15="http://schemas.microsoft.com/office/drawing/2012/chart" uri="{CE6537A1-D6FC-4f65-9D91-7224C49458BB}"/>
-                <c:ext xmlns:c16="http://schemas.microsoft.com/office/drawing/2014/chart" uri="{C3380CC4-5D6E-409C-BE32-E72D297353CC}">
-                  <c16:uniqueId val="{00000013-9c7c-5234-f38e-4d764bc6aa3c}"/>
-                </c:ext>
-              </c:extLst>
-            </c:dLbl>
-            <c:dLbl>
-              <c:idx val="13"/>
-              <c:tx>
-                <c:rich>
-                  <a:bodyPr>
-                    <a:spAutoFit/>
-                  </a:bodyPr>
-                  <a:lstStyle/>
-                  <a:p>
-                    <a:pPr>
-                      <a:defRPr/>
-                    </a:pPr>
-                    <a:r>
-                      <a:rPr lang="en-US" dirty="0"/>
-                      <a:t>普通外科</a:t>
-                    </a:r>
-                  </a:p>
-                </c:rich>
-              </c:tx>
-              <c:spPr>
-                <a:noFill/>
-                <a:ln>
-                  <a:noFill/>
-                </a:ln>
-                <a:effectLst/>
-              </c:spPr>
-              <c:dLblPos val="t"/>
-              <c:showLegendKey val="0"/>
-              <c:showVal val="0"/>
-              <c:showCatName val="0"/>
-              <c:showSerName val="0"/>
-              <c:showPercent val="0"/>
-              <c:showBubbleSize val="0"/>
-              <c:showLeaderLines val="1"/>
-              <c:extLst>
-                <c:ext xmlns:c15="http://schemas.microsoft.com/office/drawing/2012/chart" uri="{CE6537A1-D6FC-4f65-9D91-7224C49458BB}"/>
-                <c:ext xmlns:c16="http://schemas.microsoft.com/office/drawing/2014/chart" uri="{C3380CC4-5D6E-409C-BE32-E72D297353CC}">
-                  <c16:uniqueId val="{00000014-9c7c-5234-f38e-4d764bc6aa3c}"/>
-                </c:ext>
-              </c:extLst>
-            </c:dLbl>
-            <c:dLbl>
-              <c:idx val="14"/>
-              <c:tx>
-                <c:rich>
-                  <a:bodyPr>
-                    <a:spAutoFit/>
-                  </a:bodyPr>
-                  <a:lstStyle/>
-                  <a:p>
-                    <a:pPr>
-                      <a:defRPr/>
-                    </a:pPr>
-                    <a:r>
-                      <a:rPr lang="en-US" dirty="0"/>
-                      <a:t>中医经典科</a:t>
-                    </a:r>
-                  </a:p>
-                </c:rich>
-              </c:tx>
-              <c:spPr>
-                <a:noFill/>
-                <a:ln>
-                  <a:noFill/>
-                </a:ln>
-                <a:effectLst/>
-              </c:spPr>
-              <c:dLblPos val="t"/>
-              <c:showLegendKey val="0"/>
-              <c:showVal val="0"/>
-              <c:showCatName val="0"/>
-              <c:showSerName val="0"/>
-              <c:showPercent val="0"/>
-              <c:showBubbleSize val="0"/>
-              <c:showLeaderLines val="1"/>
-              <c:extLst>
-                <c:ext xmlns:c15="http://schemas.microsoft.com/office/drawing/2012/chart" uri="{CE6537A1-D6FC-4f65-9D91-7224C49458BB}"/>
-                <c:ext xmlns:c16="http://schemas.microsoft.com/office/drawing/2014/chart" uri="{C3380CC4-5D6E-409C-BE32-E72D297353CC}">
-                  <c16:uniqueId val="{00000015-9c7c-5234-f38e-4d764bc6aa3c}"/>
-                </c:ext>
-              </c:extLst>
-            </c:dLbl>
-            <c:dLbl>
-              <c:idx val="15"/>
-              <c:tx>
-                <c:rich>
-                  <a:bodyPr>
-                    <a:spAutoFit/>
-                  </a:bodyPr>
-                  <a:lstStyle/>
-                  <a:p>
-                    <a:pPr>
-                      <a:defRPr/>
-                    </a:pPr>
-                    <a:r>
-                      <a:rPr lang="en-US" dirty="0"/>
-                      <a:t>治未病中心</a:t>
-                    </a:r>
-                  </a:p>
-                </c:rich>
-              </c:tx>
-              <c:spPr>
-                <a:noFill/>
-                <a:ln>
-                  <a:noFill/>
-                </a:ln>
-                <a:effectLst/>
-              </c:spPr>
-              <c:dLblPos val="t"/>
-              <c:showLegendKey val="0"/>
-              <c:showVal val="0"/>
-              <c:showCatName val="0"/>
-              <c:showSerName val="0"/>
-              <c:showPercent val="0"/>
-              <c:showBubbleSize val="0"/>
-              <c:showLeaderLines val="1"/>
-              <c:extLst>
-                <c:ext xmlns:c15="http://schemas.microsoft.com/office/drawing/2012/chart" uri="{CE6537A1-D6FC-4f65-9D91-7224C49458BB}"/>
-                <c:ext xmlns:c16="http://schemas.microsoft.com/office/drawing/2014/chart" uri="{C3380CC4-5D6E-409C-BE32-E72D297353CC}">
-                  <c16:uniqueId val="{00000016-9c7c-5234-f38e-4d764bc6aa3c}"/>
-                </c:ext>
-              </c:extLst>
-            </c:dLbl>
-            <c:dLbl>
-              <c:idx val="16"/>
-              <c:tx>
-                <c:rich>
-                  <a:bodyPr>
-                    <a:spAutoFit/>
-                  </a:bodyPr>
-                  <a:lstStyle/>
-                  <a:p>
-                    <a:pPr>
-                      <a:defRPr/>
-                    </a:pPr>
-                    <a:r>
-                      <a:rPr lang="en-US" dirty="0"/>
-                      <a:t>东区重症医学科</a:t>
-                    </a:r>
-                  </a:p>
-                </c:rich>
-              </c:tx>
-              <c:spPr>
-                <a:noFill/>
-                <a:ln>
-                  <a:noFill/>
-                </a:ln>
-                <a:effectLst/>
-              </c:spPr>
-              <c:dLblPos val="t"/>
-              <c:showLegendKey val="0"/>
-              <c:showVal val="0"/>
-              <c:showCatName val="0"/>
-              <c:showSerName val="0"/>
-              <c:showPercent val="0"/>
-              <c:showBubbleSize val="0"/>
-              <c:showLeaderLines val="1"/>
-              <c:extLst>
-                <c:ext xmlns:c15="http://schemas.microsoft.com/office/drawing/2012/chart" uri="{CE6537A1-D6FC-4f65-9D91-7224C49458BB}"/>
-                <c:ext xmlns:c16="http://schemas.microsoft.com/office/drawing/2014/chart" uri="{C3380CC4-5D6E-409C-BE32-E72D297353CC}">
-                  <c16:uniqueId val="{00000017-9c7c-5234-f38e-4d764bc6aa3c}"/>
-                </c:ext>
-              </c:extLst>
-            </c:dLbl>
-            <c:dLbl>
-              <c:idx val="17"/>
-              <c:tx>
-                <c:rich>
-                  <a:bodyPr>
-                    <a:spAutoFit/>
-                  </a:bodyPr>
-                  <a:lstStyle/>
-                  <a:p>
-                    <a:pPr>
-                      <a:defRPr/>
-                    </a:pPr>
-                    <a:r>
-                      <a:rPr lang="en-US" dirty="0"/>
-                      <a:t>小儿骨科</a:t>
-                    </a:r>
-                  </a:p>
-                </c:rich>
-              </c:tx>
-              <c:spPr>
-                <a:noFill/>
-                <a:ln>
-                  <a:noFill/>
-                </a:ln>
-                <a:effectLst/>
-              </c:spPr>
-              <c:dLblPos val="t"/>
-              <c:showLegendKey val="0"/>
-              <c:showVal val="0"/>
-              <c:showCatName val="0"/>
-              <c:showSerName val="0"/>
-              <c:showPercent val="0"/>
-              <c:showBubbleSize val="0"/>
-              <c:showLeaderLines val="1"/>
-              <c:extLst>
-                <c:ext xmlns:c15="http://schemas.microsoft.com/office/drawing/2012/chart" uri="{CE6537A1-D6FC-4f65-9D91-7224C49458BB}"/>
-                <c:ext xmlns:c16="http://schemas.microsoft.com/office/drawing/2014/chart" uri="{C3380CC4-5D6E-409C-BE32-E72D297353CC}">
-                  <c16:uniqueId val="{00000018-9c7c-5234-f38e-4d764bc6aa3c}"/>
-                </c:ext>
-              </c:extLst>
-            </c:dLbl>
-            <c:dLbl>
-              <c:idx val="18"/>
-              <c:tx>
-                <c:rich>
-                  <a:bodyPr>
-                    <a:spAutoFit/>
-                  </a:bodyPr>
-                  <a:lstStyle/>
-                  <a:p>
-                    <a:pPr>
-                      <a:defRPr/>
-                    </a:pPr>
-                    <a:r>
-                      <a:rPr lang="en-US" dirty="0"/>
-                      <a:t>妇科妇二科合并</a:t>
-                    </a:r>
-                  </a:p>
-                </c:rich>
-              </c:tx>
-              <c:spPr>
-                <a:noFill/>
-                <a:ln>
-                  <a:noFill/>
-                </a:ln>
-                <a:effectLst/>
-              </c:spPr>
-              <c:dLblPos val="t"/>
-              <c:showLegendKey val="0"/>
-              <c:showVal val="0"/>
-              <c:showCatName val="0"/>
-              <c:showSerName val="0"/>
-              <c:showPercent val="0"/>
-              <c:showBubbleSize val="0"/>
-              <c:showLeaderLines val="1"/>
-              <c:extLst>
-                <c:ext xmlns:c15="http://schemas.microsoft.com/office/drawing/2012/chart" uri="{CE6537A1-D6FC-4f65-9D91-7224C49458BB}"/>
-                <c:ext xmlns:c16="http://schemas.microsoft.com/office/drawing/2014/chart" uri="{C3380CC4-5D6E-409C-BE32-E72D297353CC}">
-                  <c16:uniqueId val="{00000019-9c7c-5234-f38e-4d764bc6aa3c}"/>
+                  <c16:uniqueId val="{00000019-fca5-e63e-25ca-787bae8f6888}"/>
                 </c:ext>
               </c:extLst>
             </c:dLbl>
@@ -2277,7 +2277,7 @@
               <c:extLst>
                 <c:ext xmlns:c15="http://schemas.microsoft.com/office/drawing/2012/chart" uri="{CE6537A1-D6FC-4f65-9D91-7224C49458BB}"/>
                 <c:ext xmlns:c16="http://schemas.microsoft.com/office/drawing/2014/chart" uri="{C3380CC4-5D6E-409C-BE32-E72D297353CC}">
-                  <c16:uniqueId val="{00000020-9c7c-5234-f38e-4d764bc6aa3c}"/>
+                  <c16:uniqueId val="{00000020-fca5-e63e-25ca-787bae8f6888}"/>
                 </c:ext>
               </c:extLst>
             </c:dLbl>
@@ -2289,64 +2289,64 @@
                 <c:formatCode>General</c:formatCode>
                 <c:ptCount val="20"/>
                 <c:pt idx="0">
-                  <c:v>14.214964427052658</c:v>
+                  <c:v>17.14432897386203</c:v>
                 </c:pt>
                 <c:pt idx="1">
-                  <c:v>18.736210607864283</c:v>
+                  <c:v>27.253497420782384</c:v>
                 </c:pt>
                 <c:pt idx="2">
-                  <c:v>9.348682835643647</c:v>
+                  <c:v>18.893481077690215</c:v>
                 </c:pt>
                 <c:pt idx="3">
-                  <c:v>13.696451235734125</c:v>
+                  <c:v>11.750432718512632</c:v>
                 </c:pt>
                 <c:pt idx="4">
-                  <c:v>100</c:v>
+                  <c:v>14.62999246405875</c:v>
                 </c:pt>
                 <c:pt idx="5">
-                  <c:v>11.243888062591882</c:v>
+                  <c:v>13.401187747652159</c:v>
                 </c:pt>
                 <c:pt idx="6">
-                  <c:v>10.874424664840717</c:v>
+                  <c:v>11.893674730092497</c:v>
                 </c:pt>
                 <c:pt idx="7">
-                  <c:v>35.29791612457484</c:v>
+                  <c:v>12.649821795767343</c:v>
                 </c:pt>
                 <c:pt idx="8">
-                  <c:v>19.346318025864903</c:v>
+                  <c:v>14.90045775554998</c:v>
                 </c:pt>
                 <c:pt idx="9">
-                  <c:v>23.95121706116508</c:v>
+                  <c:v>3.292653794692493</c:v>
                 </c:pt>
                 <c:pt idx="10">
-                  <c:v>30.85539509555974</c:v>
+                  <c:v>9.195612423158126</c:v>
                 </c:pt>
                 <c:pt idx="11">
-                  <c:v>34.218341698323776</c:v>
+                  <c:v>16.96426930316883</c:v>
                 </c:pt>
                 <c:pt idx="12">
-                  <c:v>20.066389016362997</c:v>
+                  <c:v>12.442507399645553</c:v>
                 </c:pt>
                 <c:pt idx="13">
-                  <c:v>5.283111710873318</c:v>
+                  <c:v>99.99999999999999</c:v>
                 </c:pt>
                 <c:pt idx="14">
-                  <c:v>30.04138813605689</c:v>
+                  <c:v>15.752480600392312</c:v>
                 </c:pt>
                 <c:pt idx="15">
-                  <c:v>18.408066630845695</c:v>
+                  <c:v>10.260588698857578</c:v>
                 </c:pt>
                 <c:pt idx="16">
-                  <c:v>2.812038098308511</c:v>
+                  <c:v>11.830678869310315</c:v>
                 </c:pt>
                 <c:pt idx="17">
-                  <c:v>14.016367039218217</c:v>
+                  <c:v>11.15179313601716</c:v>
                 </c:pt>
                 <c:pt idx="18">
-                  <c:v>53.912037033685785</c:v>
+                  <c:v>5.767134687403704</c:v>
                 </c:pt>
                 <c:pt idx="19">
-                  <c:v>86.28709570038926</c:v>
+                  <c:v>4.145673671522844</c:v>
                 </c:pt>
               </c:numCache>
             </c:numRef>
@@ -2361,61 +2361,61 @@
                   <c:v>100</c:v>
                 </c:pt>
                 <c:pt idx="1">
-                  <c:v>0.002383219160954926</c:v>
+                  <c:v>0.0023870969166429573</c:v>
                 </c:pt>
                 <c:pt idx="2">
-                  <c:v>0.0023489154886042127</c:v>
+                  <c:v>0.002354296007145399</c:v>
                 </c:pt>
                 <c:pt idx="3">
-                  <c:v>0.0023281598325801327</c:v>
+                  <c:v>0.0023442812864731964</c:v>
                 </c:pt>
                 <c:pt idx="4">
-                  <c:v>0.0022361007128397035</c:v>
+                  <c:v>0.002270986121573355</c:v>
                 </c:pt>
                 <c:pt idx="5">
-                  <c:v>0.00217834208292301</c:v>
+                  <c:v>0.002198586897882922</c:v>
                 </c:pt>
                 <c:pt idx="6">
-                  <c:v>0.002132404309779339</c:v>
+                  <c:v>0.0021886558075993813</c:v>
                 </c:pt>
                 <c:pt idx="7">
-                  <c:v>0.0021294135669049875</c:v>
+                  <c:v>0.0021694062252020302</c:v>
                 </c:pt>
                 <c:pt idx="8">
-                  <c:v>0.0021201133128033625</c:v>
+                  <c:v>0.0021255253946369196</c:v>
                 </c:pt>
                 <c:pt idx="9">
-                  <c:v>0.002087612419226649</c:v>
+                  <c:v>0.0021030950129101544</c:v>
                 </c:pt>
                 <c:pt idx="10">
-                  <c:v>0.0020207227506924236</c:v>
+                  <c:v>0.0020870280150097798</c:v>
                 </c:pt>
                 <c:pt idx="11">
-                  <c:v>0.00201350585548696</c:v>
+                  <c:v>0.0020847743827613957</c:v>
                 </c:pt>
                 <c:pt idx="12">
-                  <c:v>0.0020125372859875917</c:v>
+                  <c:v>0.001995564665107706</c:v>
                 </c:pt>
                 <c:pt idx="13">
-                  <c:v>0.0019953562254469625</c:v>
+                  <c:v>0.0019570708795094505</c:v>
                 </c:pt>
                 <c:pt idx="14">
-                  <c:v>0.0019399772083270514</c:v>
+                  <c:v>0.0019502177590532731</c:v>
                 </c:pt>
                 <c:pt idx="15">
-                  <c:v>0.0019084920249531193</c:v>
+                  <c:v>0.0019116688362185203</c:v>
                 </c:pt>
                 <c:pt idx="16">
-                  <c:v>0.0019019815121753907</c:v>
+                  <c:v>0.0019024288886407142</c:v>
                 </c:pt>
                 <c:pt idx="17">
-                  <c:v>0.0017995801884231161</c:v>
+                  <c:v>0.001857504799390602</c:v>
                 </c:pt>
                 <c:pt idx="18">
-                  <c:v>0.0017782837199025988</c:v>
+                  <c:v>0.0018147548103379365</c:v>
                 </c:pt>
                 <c:pt idx="19">
-                  <c:v>0.0017299737592286896</c:v>
+                  <c:v>0.0016957392981919468</c:v>
                 </c:pt>
               </c:numCache>
             </c:numRef>

</xml_diff>